<commit_message>
add images in french also
</commit_message>
<xml_diff>
--- a/presentation_fr/pres.pptx
+++ b/presentation_fr/pres.pptx
@@ -13,16 +13,16 @@
   <p:sldIdLst>
     <p:sldId id="256" r:id="rId2"/>
     <p:sldId id="257" r:id="rId3"/>
-    <p:sldId id="258" r:id="rId4"/>
+    <p:sldId id="290" r:id="rId4"/>
     <p:sldId id="286" r:id="rId5"/>
     <p:sldId id="259" r:id="rId6"/>
     <p:sldId id="260" r:id="rId7"/>
     <p:sldId id="262" r:id="rId8"/>
     <p:sldId id="264" r:id="rId9"/>
     <p:sldId id="265" r:id="rId10"/>
-    <p:sldId id="266" r:id="rId11"/>
-    <p:sldId id="267" r:id="rId12"/>
-    <p:sldId id="268" r:id="rId13"/>
+    <p:sldId id="268" r:id="rId11"/>
+    <p:sldId id="266" r:id="rId12"/>
+    <p:sldId id="267" r:id="rId13"/>
     <p:sldId id="269" r:id="rId14"/>
     <p:sldId id="287" r:id="rId15"/>
     <p:sldId id="275" r:id="rId16"/>
@@ -3473,6 +3473,330 @@
         </p:nvSpPr>
         <p:spPr>
           <a:xfrm>
+            <a:off x="196467" y="1778821"/>
+            <a:ext cx="8775700" cy="3203082"/>
+          </a:xfrm>
+        </p:spPr>
+        <p:txBody>
+          <a:bodyPr/>
+          <a:lstStyle/>
+          <a:p>
+            <a:r>
+              <a:rPr lang="en-US" dirty="0" smtClean="0"/>
+              <a:t>Server </a:t>
+            </a:r>
+            <a:r>
+              <a:rPr lang="en-US" dirty="0" err="1" smtClean="0"/>
+              <a:t>WebSocket</a:t>
+            </a:r>
+            <a:r>
+              <a:rPr lang="en-US" dirty="0" smtClean="0"/>
+              <a:t>:</a:t>
+            </a:r>
+          </a:p>
+          <a:p>
+            <a:pPr lvl="1"/>
+            <a:r>
+              <a:rPr lang="en-US" dirty="0" err="1" smtClean="0"/>
+              <a:t>Basée</a:t>
+            </a:r>
+            <a:r>
+              <a:rPr lang="en-US" dirty="0" smtClean="0"/>
+              <a:t> </a:t>
+            </a:r>
+            <a:r>
+              <a:rPr lang="en-US" dirty="0" err="1" smtClean="0"/>
+              <a:t>sur</a:t>
+            </a:r>
+            <a:r>
+              <a:rPr lang="en-US" dirty="0" smtClean="0"/>
+              <a:t> le </a:t>
+            </a:r>
+            <a:r>
+              <a:rPr lang="en-US" dirty="0" err="1" smtClean="0"/>
+              <a:t>webserver</a:t>
+            </a:r>
+            <a:r>
+              <a:rPr lang="en-US" dirty="0" smtClean="0"/>
+              <a:t> Tornado</a:t>
+            </a:r>
+          </a:p>
+          <a:p>
+            <a:pPr lvl="1"/>
+            <a:r>
+              <a:rPr lang="fr-FR" i="1" dirty="0" smtClean="0"/>
+              <a:t>ws://sockets.mbed.org/ws/</a:t>
+            </a:r>
+            <a:r>
+              <a:rPr lang="fr-FR" i="1" dirty="0" smtClean="0">
+                <a:solidFill>
+                  <a:srgbClr val="FF0000"/>
+                </a:solidFill>
+              </a:rPr>
+              <a:t>&lt;channel&gt;</a:t>
+            </a:r>
+            <a:r>
+              <a:rPr lang="fr-FR" i="1" dirty="0" smtClean="0"/>
+              <a:t>/</a:t>
+            </a:r>
+            <a:r>
+              <a:rPr lang="fr-FR" i="1" dirty="0" smtClean="0">
+                <a:solidFill>
+                  <a:schemeClr val="accent3"/>
+                </a:solidFill>
+              </a:rPr>
+              <a:t>&lt;mode&gt;</a:t>
+            </a:r>
+            <a:endParaRPr lang="en-US" i="1" dirty="0" smtClean="0">
+              <a:solidFill>
+                <a:schemeClr val="accent3"/>
+              </a:solidFill>
+            </a:endParaRPr>
+          </a:p>
+          <a:p>
+            <a:pPr lvl="1"/>
+            <a:r>
+              <a:rPr lang="en-US" dirty="0" smtClean="0"/>
+              <a:t>Un client </a:t>
+            </a:r>
+            <a:r>
+              <a:rPr lang="en-US" dirty="0" err="1" smtClean="0"/>
+              <a:t>est</a:t>
+            </a:r>
+            <a:r>
+              <a:rPr lang="en-US" dirty="0" smtClean="0"/>
+              <a:t> </a:t>
+            </a:r>
+            <a:r>
+              <a:rPr lang="en-US" dirty="0" err="1" smtClean="0"/>
+              <a:t>connecté</a:t>
+            </a:r>
+            <a:r>
+              <a:rPr lang="en-US" dirty="0" smtClean="0"/>
+              <a:t> à </a:t>
+            </a:r>
+            <a:r>
+              <a:rPr lang="en-US" dirty="0" err="1" smtClean="0"/>
+              <a:t>travers</a:t>
+            </a:r>
+            <a:r>
+              <a:rPr lang="en-US" dirty="0" smtClean="0"/>
+              <a:t> un “</a:t>
+            </a:r>
+            <a:r>
+              <a:rPr lang="en-US" b="1" dirty="0" smtClean="0"/>
+              <a:t>channel</a:t>
+            </a:r>
+            <a:r>
+              <a:rPr lang="en-US" dirty="0" smtClean="0"/>
+              <a:t>”</a:t>
+            </a:r>
+          </a:p>
+          <a:p>
+            <a:pPr lvl="1"/>
+            <a:r>
+              <a:rPr lang="en-US" dirty="0" smtClean="0"/>
+              <a:t>Au </a:t>
+            </a:r>
+            <a:r>
+              <a:rPr lang="en-US" dirty="0" err="1" smtClean="0"/>
+              <a:t>sein</a:t>
+            </a:r>
+            <a:r>
+              <a:rPr lang="en-US" dirty="0" smtClean="0"/>
+              <a:t> d’un </a:t>
+            </a:r>
+            <a:r>
+              <a:rPr lang="en-US" dirty="0" err="1" smtClean="0"/>
+              <a:t>même</a:t>
+            </a:r>
+            <a:r>
+              <a:rPr lang="en-US" dirty="0" smtClean="0"/>
+              <a:t> channel, des messages </a:t>
+            </a:r>
+            <a:r>
+              <a:rPr lang="en-US" dirty="0" err="1" smtClean="0"/>
+              <a:t>peuvent</a:t>
+            </a:r>
+            <a:r>
+              <a:rPr lang="en-US" dirty="0" smtClean="0"/>
+              <a:t> </a:t>
+            </a:r>
+            <a:r>
+              <a:rPr lang="en-US" dirty="0" err="1" smtClean="0"/>
+              <a:t>être</a:t>
+            </a:r>
+            <a:r>
+              <a:rPr lang="en-US" dirty="0" smtClean="0"/>
+              <a:t> </a:t>
+            </a:r>
+            <a:r>
+              <a:rPr lang="en-US" dirty="0" err="1" smtClean="0"/>
+              <a:t>échangés</a:t>
+            </a:r>
+            <a:r>
+              <a:rPr lang="en-US" dirty="0" smtClean="0"/>
+              <a:t> </a:t>
+            </a:r>
+            <a:r>
+              <a:rPr lang="en-US" dirty="0" err="1" smtClean="0"/>
+              <a:t>selon</a:t>
+            </a:r>
+            <a:r>
+              <a:rPr lang="en-US" dirty="0" smtClean="0"/>
+              <a:t> un “</a:t>
+            </a:r>
+            <a:r>
+              <a:rPr lang="en-US" b="1" dirty="0" smtClean="0"/>
+              <a:t>mode de </a:t>
+            </a:r>
+            <a:r>
+              <a:rPr lang="en-US" b="1" dirty="0" err="1" smtClean="0"/>
+              <a:t>connexion</a:t>
+            </a:r>
+            <a:r>
+              <a:rPr lang="en-US" dirty="0" smtClean="0"/>
+              <a:t>”:</a:t>
+            </a:r>
+          </a:p>
+          <a:p>
+            <a:pPr lvl="2"/>
+            <a:r>
+              <a:rPr lang="en-US" dirty="0" smtClean="0"/>
+              <a:t>Write-Only (</a:t>
+            </a:r>
+            <a:r>
+              <a:rPr lang="en-US" dirty="0" err="1" smtClean="0"/>
+              <a:t>wo</a:t>
+            </a:r>
+            <a:r>
+              <a:rPr lang="en-US" dirty="0" smtClean="0"/>
+              <a:t>)</a:t>
+            </a:r>
+          </a:p>
+          <a:p>
+            <a:pPr lvl="2"/>
+            <a:r>
+              <a:rPr lang="en-US" dirty="0" smtClean="0"/>
+              <a:t>Read-Only (</a:t>
+            </a:r>
+            <a:r>
+              <a:rPr lang="en-US" dirty="0" err="1" smtClean="0"/>
+              <a:t>ro</a:t>
+            </a:r>
+            <a:r>
+              <a:rPr lang="en-US" dirty="0" smtClean="0"/>
+              <a:t>)</a:t>
+            </a:r>
+          </a:p>
+          <a:p>
+            <a:pPr lvl="2"/>
+            <a:r>
+              <a:rPr lang="en-US" dirty="0" smtClean="0"/>
+              <a:t>Read-Write (</a:t>
+            </a:r>
+            <a:r>
+              <a:rPr lang="en-US" dirty="0" err="1" smtClean="0"/>
+              <a:t>rw</a:t>
+            </a:r>
+            <a:r>
+              <a:rPr lang="en-US" dirty="0" smtClean="0"/>
+              <a:t>)</a:t>
+            </a:r>
+          </a:p>
+          <a:p>
+            <a:pPr lvl="1"/>
+            <a:endParaRPr lang="en-US" dirty="0"/>
+          </a:p>
+        </p:txBody>
+      </p:sp>
+    </p:spTree>
+  </p:cSld>
+  <p:clrMapOvr>
+    <a:masterClrMapping/>
+  </p:clrMapOvr>
+  <p:timing>
+    <p:tnLst>
+      <p:par>
+        <p:cTn id="1" dur="indefinite" restart="never" nodeType="tmRoot"/>
+      </p:par>
+    </p:tnLst>
+  </p:timing>
+</p:sld>
+</file>
+
+<file path=ppt/slides/slide11.xml><?xml version="1.0" encoding="utf-8"?>
+<p:sld xmlns:a="http://schemas.openxmlformats.org/drawingml/2006/main" xmlns:r="http://schemas.openxmlformats.org/officeDocument/2006/relationships" xmlns:p="http://schemas.openxmlformats.org/presentationml/2006/main">
+  <p:cSld>
+    <p:spTree>
+      <p:nvGrpSpPr>
+        <p:cNvPr id="1" name=""/>
+        <p:cNvGrpSpPr/>
+        <p:nvPr/>
+      </p:nvGrpSpPr>
+      <p:grpSpPr>
+        <a:xfrm>
+          <a:off x="0" y="0"/>
+          <a:ext cx="0" cy="0"/>
+          <a:chOff x="0" y="0"/>
+          <a:chExt cx="0" cy="0"/>
+        </a:xfrm>
+      </p:grpSpPr>
+      <p:sp>
+        <p:nvSpPr>
+          <p:cNvPr id="2" name="Titre 1"/>
+          <p:cNvSpPr>
+            <a:spLocks noGrp="1"/>
+          </p:cNvSpPr>
+          <p:nvPr>
+            <p:ph type="title"/>
+          </p:nvPr>
+        </p:nvSpPr>
+        <p:spPr/>
+        <p:txBody>
+          <a:bodyPr/>
+          <a:lstStyle/>
+          <a:p>
+            <a:r>
+              <a:rPr lang="en-US" dirty="0" err="1" smtClean="0"/>
+              <a:t>IoD</a:t>
+            </a:r>
+            <a:r>
+              <a:rPr lang="en-US" dirty="0" smtClean="0"/>
+              <a:t>: </a:t>
+            </a:r>
+            <a:r>
+              <a:rPr lang="en-US" dirty="0" err="1" smtClean="0"/>
+              <a:t>connexion</a:t>
+            </a:r>
+            <a:r>
+              <a:rPr lang="en-US" dirty="0" smtClean="0"/>
+              <a:t> de </a:t>
+            </a:r>
+            <a:r>
+              <a:rPr lang="en-US" dirty="0" err="1" smtClean="0"/>
+              <a:t>capteurs</a:t>
+            </a:r>
+            <a:r>
+              <a:rPr lang="en-US" dirty="0" smtClean="0"/>
+              <a:t> à Internet</a:t>
+            </a:r>
+            <a:endParaRPr lang="en-US" dirty="0"/>
+          </a:p>
+        </p:txBody>
+      </p:sp>
+      <p:sp>
+        <p:nvSpPr>
+          <p:cNvPr id="3" name="Espace réservé du contenu 2"/>
+          <p:cNvSpPr>
+            <a:spLocks noGrp="1"/>
+          </p:cNvSpPr>
+          <p:nvPr>
+            <p:ph idx="1"/>
+          </p:nvPr>
+        </p:nvSpPr>
+        <p:spPr>
+          <a:xfrm>
             <a:off x="217488" y="906463"/>
             <a:ext cx="8775700" cy="607027"/>
           </a:xfrm>
@@ -3497,7 +3821,6 @@
               <a:rPr lang="en-US" dirty="0" smtClean="0"/>
               <a:t>:</a:t>
             </a:r>
-            <a:endParaRPr lang="en-US" dirty="0" smtClean="0"/>
           </a:p>
           <a:p>
             <a:pPr lvl="1">
@@ -3619,14 +3942,7 @@
                 <a:latin typeface="+mn-lt"/>
                 <a:ea typeface="+mn-ea"/>
               </a:rPr>
-              <a:t> de Roving </a:t>
-            </a:r>
-            <a:r>
-              <a:rPr lang="en-US" sz="1800" b="0" kern="0" dirty="0" smtClean="0">
-                <a:latin typeface="+mn-lt"/>
-                <a:ea typeface="+mn-ea"/>
-              </a:rPr>
-              <a:t>Networks:</a:t>
+              <a:t> de Roving Networks:</a:t>
             </a:r>
           </a:p>
           <a:p>
@@ -3646,14 +3962,7 @@
                 <a:latin typeface="+mn-lt"/>
                 <a:ea typeface="+mn-ea"/>
               </a:rPr>
-              <a:t>Pile </a:t>
-            </a:r>
-            <a:r>
-              <a:rPr lang="en-US" sz="1800" b="0" kern="0" dirty="0" smtClean="0">
-                <a:latin typeface="+mn-lt"/>
-                <a:ea typeface="+mn-ea"/>
-              </a:rPr>
-              <a:t>TCP/IP </a:t>
+              <a:t>Pile TCP/IP </a:t>
             </a:r>
             <a:r>
               <a:rPr lang="en-US" sz="1800" b="0" kern="0" dirty="0" err="1" smtClean="0">
@@ -3694,24 +4003,7 @@
                 <a:ea typeface="+mn-ea"/>
                 <a:cs typeface="+mn-cs"/>
               </a:rPr>
-              <a:t>Communication </a:t>
-            </a:r>
-            <a:r>
-              <a:rPr kumimoji="0" lang="en-US" sz="1800" b="0" i="0" u="none" strike="noStrike" kern="0" cap="none" spc="0" normalizeH="0" baseline="0" noProof="0" dirty="0" smtClean="0">
-                <a:ln>
-                  <a:noFill/>
-                </a:ln>
-                <a:solidFill>
-                  <a:srgbClr val="000000"/>
-                </a:solidFill>
-                <a:effectLst/>
-                <a:uLnTx/>
-                <a:uFillTx/>
-                <a:latin typeface="+mn-lt"/>
-                <a:ea typeface="+mn-ea"/>
-                <a:cs typeface="+mn-cs"/>
-              </a:rPr>
-              <a:t>avec le </a:t>
+              <a:t>Communication avec le </a:t>
             </a:r>
             <a:r>
               <a:rPr kumimoji="0" lang="en-US" sz="1800" b="0" i="0" u="none" strike="noStrike" kern="0" cap="none" spc="0" normalizeH="0" baseline="0" noProof="0" dirty="0" err="1" smtClean="0">
@@ -3812,6 +4104,71 @@
               </a:rPr>
               <a:t>WebSocket</a:t>
             </a:r>
+            <a:endParaRPr lang="en-US" sz="1800" b="0" kern="0" dirty="0" smtClean="0">
+              <a:latin typeface="+mn-lt"/>
+              <a:ea typeface="+mn-ea"/>
+            </a:endParaRPr>
+          </a:p>
+          <a:p>
+            <a:pPr marL="722313" lvl="1" indent="-265113" algn="l" fontAlgn="ctr">
+              <a:spcBef>
+                <a:spcPct val="25000"/>
+              </a:spcBef>
+              <a:buClr>
+                <a:schemeClr val="accent1"/>
+              </a:buClr>
+              <a:buSzPct val="125000"/>
+              <a:buFont typeface="Wingdings" pitchFamily="2" charset="2"/>
+              <a:buChar char="§"/>
+            </a:pPr>
+            <a:r>
+              <a:rPr kumimoji="0" lang="en-US" sz="1800" b="0" i="0" u="none" strike="noStrike" kern="0" cap="none" spc="0" normalizeH="0" baseline="0" noProof="0" dirty="0" err="1" smtClean="0">
+                <a:ln>
+                  <a:noFill/>
+                </a:ln>
+                <a:solidFill>
+                  <a:srgbClr val="000000"/>
+                </a:solidFill>
+                <a:effectLst/>
+                <a:uLnTx/>
+                <a:uFillTx/>
+                <a:latin typeface="+mn-lt"/>
+                <a:ea typeface="+mn-ea"/>
+              </a:rPr>
+              <a:t>Connexion</a:t>
+            </a:r>
+            <a:r>
+              <a:rPr kumimoji="0" lang="en-US" sz="1800" b="0" i="0" u="none" strike="noStrike" kern="0" cap="none" spc="0" normalizeH="0" baseline="0" noProof="0" dirty="0" smtClean="0">
+                <a:ln>
+                  <a:noFill/>
+                </a:ln>
+                <a:solidFill>
+                  <a:srgbClr val="000000"/>
+                </a:solidFill>
+                <a:effectLst/>
+                <a:uLnTx/>
+                <a:uFillTx/>
+                <a:latin typeface="+mn-lt"/>
+                <a:ea typeface="+mn-ea"/>
+              </a:rPr>
+              <a:t> au server </a:t>
+            </a:r>
+            <a:r>
+              <a:rPr kumimoji="0" lang="en-US" sz="1800" b="0" i="0" u="none" strike="noStrike" kern="0" cap="none" spc="0" normalizeH="0" baseline="0" noProof="0" dirty="0" err="1" smtClean="0">
+                <a:ln>
+                  <a:noFill/>
+                </a:ln>
+                <a:solidFill>
+                  <a:srgbClr val="000000"/>
+                </a:solidFill>
+                <a:effectLst/>
+                <a:uLnTx/>
+                <a:uFillTx/>
+                <a:latin typeface="+mn-lt"/>
+                <a:ea typeface="+mn-ea"/>
+              </a:rPr>
+              <a:t>WebSocket</a:t>
+            </a:r>
             <a:endParaRPr kumimoji="0" lang="en-US" sz="1800" b="0" i="0" u="none" strike="noStrike" kern="0" cap="none" spc="0" normalizeH="0" baseline="0" noProof="0" dirty="0">
               <a:ln>
                 <a:noFill/>
@@ -3829,7 +4186,7 @@
       </p:sp>
       <p:pic>
         <p:nvPicPr>
-          <p:cNvPr id="2051" name="Picture 3" descr="C:\Users\samux\Desktop\ARM-internship-report\report\acc_board_component.jpg"/>
+          <p:cNvPr id="1026" name="Picture 2" descr="C:\Users\samux\Desktop\ARM-internship-report\presentation_fr\acc_board_component.png"/>
           <p:cNvPicPr>
             <a:picLocks noChangeAspect="1" noChangeArrowheads="1"/>
           </p:cNvPicPr>
@@ -3844,8 +4201,8 @@
         </p:blipFill>
         <p:spPr bwMode="auto">
           <a:xfrm>
-            <a:off x="5361919" y="1236663"/>
-            <a:ext cx="2562882" cy="2734237"/>
+            <a:off x="5528442" y="1246079"/>
+            <a:ext cx="3130496" cy="2878164"/>
           </a:xfrm>
           <a:prstGeom prst="rect">
             <a:avLst/>
@@ -3855,7 +4212,7 @@
       </p:pic>
       <p:pic>
         <p:nvPicPr>
-          <p:cNvPr id="2052" name="Picture 4" descr="C:\Users\samux\Desktop\ARM-internship-report\report\env_board.png"/>
+          <p:cNvPr id="1027" name="Picture 3" descr="C:\Users\samux\Desktop\ARM-internship-report\presentation_fr\env_board.png"/>
           <p:cNvPicPr>
             <a:picLocks noChangeAspect="1" noChangeArrowheads="1"/>
           </p:cNvPicPr>
@@ -3870,409 +4227,8 @@
         </p:blipFill>
         <p:spPr bwMode="auto">
           <a:xfrm>
-            <a:off x="1088476" y="1435100"/>
-            <a:ext cx="3147192" cy="2410615"/>
-          </a:xfrm>
-          <a:prstGeom prst="rect">
-            <a:avLst/>
-          </a:prstGeom>
-          <a:noFill/>
-        </p:spPr>
-      </p:pic>
-    </p:spTree>
-  </p:cSld>
-  <p:clrMapOvr>
-    <a:masterClrMapping/>
-  </p:clrMapOvr>
-  <p:timing>
-    <p:tnLst>
-      <p:par>
-        <p:cTn id="1" dur="indefinite" restart="never" nodeType="tmRoot"/>
-      </p:par>
-    </p:tnLst>
-  </p:timing>
-</p:sld>
-</file>
-
-<file path=ppt/slides/slide11.xml><?xml version="1.0" encoding="utf-8"?>
-<p:sld xmlns:a="http://schemas.openxmlformats.org/drawingml/2006/main" xmlns:r="http://schemas.openxmlformats.org/officeDocument/2006/relationships" xmlns:p="http://schemas.openxmlformats.org/presentationml/2006/main">
-  <p:cSld>
-    <p:spTree>
-      <p:nvGrpSpPr>
-        <p:cNvPr id="1" name=""/>
-        <p:cNvGrpSpPr/>
-        <p:nvPr/>
-      </p:nvGrpSpPr>
-      <p:grpSpPr>
-        <a:xfrm>
-          <a:off x="0" y="0"/>
-          <a:ext cx="0" cy="0"/>
-          <a:chOff x="0" y="0"/>
-          <a:chExt cx="0" cy="0"/>
-        </a:xfrm>
-      </p:grpSpPr>
-      <p:sp>
-        <p:nvSpPr>
-          <p:cNvPr id="3" name="Espace réservé du contenu 2"/>
-          <p:cNvSpPr>
-            <a:spLocks noGrp="1"/>
-          </p:cNvSpPr>
-          <p:nvPr>
-            <p:ph idx="1"/>
-          </p:nvPr>
-        </p:nvSpPr>
-        <p:spPr/>
-        <p:txBody>
-          <a:bodyPr/>
-          <a:lstStyle/>
-          <a:p>
-            <a:r>
-              <a:rPr lang="en-US" dirty="0" err="1" smtClean="0"/>
-              <a:t>Navigateurs</a:t>
-            </a:r>
-            <a:r>
-              <a:rPr lang="en-US" dirty="0" smtClean="0"/>
-              <a:t>:</a:t>
-            </a:r>
-            <a:endParaRPr lang="en-US" dirty="0"/>
-          </a:p>
-        </p:txBody>
-      </p:sp>
-      <p:sp>
-        <p:nvSpPr>
-          <p:cNvPr id="4" name="Espace réservé du contenu 2"/>
-          <p:cNvSpPr>
-            <a:spLocks noGrp="1"/>
-          </p:cNvSpPr>
-          <p:nvPr>
-            <p:ph type="title"/>
-          </p:nvPr>
-        </p:nvSpPr>
-        <p:spPr/>
-        <p:txBody>
-          <a:bodyPr/>
-          <a:lstStyle/>
-          <a:p>
-            <a:r>
-              <a:rPr lang="en-US" dirty="0" err="1" smtClean="0"/>
-              <a:t>IoD</a:t>
-            </a:r>
-            <a:r>
-              <a:rPr lang="en-US" dirty="0" smtClean="0"/>
-              <a:t>: </a:t>
-            </a:r>
-            <a:r>
-              <a:rPr lang="en-US" dirty="0" err="1" smtClean="0"/>
-              <a:t>connexion</a:t>
-            </a:r>
-            <a:r>
-              <a:rPr lang="en-US" dirty="0" smtClean="0"/>
-              <a:t> de </a:t>
-            </a:r>
-            <a:r>
-              <a:rPr lang="en-US" dirty="0" err="1" smtClean="0"/>
-              <a:t>capteurs</a:t>
-            </a:r>
-            <a:r>
-              <a:rPr lang="en-US" dirty="0" smtClean="0"/>
-              <a:t> à Internet</a:t>
-            </a:r>
-            <a:endParaRPr lang="en-US" dirty="0"/>
-          </a:p>
-        </p:txBody>
-      </p:sp>
-      <p:sp>
-        <p:nvSpPr>
-          <p:cNvPr id="6" name="Espace réservé du contenu 2"/>
-          <p:cNvSpPr txBox="1">
-            <a:spLocks/>
-          </p:cNvSpPr>
-          <p:nvPr/>
-        </p:nvSpPr>
-        <p:spPr bwMode="auto">
-          <a:xfrm>
-            <a:off x="4151709" y="2393266"/>
-            <a:ext cx="4992291" cy="1345326"/>
-          </a:xfrm>
-          <a:prstGeom prst="rect">
-            <a:avLst/>
-          </a:prstGeom>
-          <a:noFill/>
-          <a:ln w="9525">
-            <a:noFill/>
-            <a:miter lim="800000"/>
-            <a:headEnd/>
-            <a:tailEnd/>
-          </a:ln>
-          <a:effectLst/>
-        </p:spPr>
-        <p:txBody>
-          <a:bodyPr vert="horz" wrap="square" lIns="91440" tIns="45720" rIns="91440" bIns="45720" numCol="1" anchor="t" anchorCtr="0" compatLnSpc="1">
-            <a:prstTxWarp prst="textNoShape">
-              <a:avLst/>
-            </a:prstTxWarp>
-          </a:bodyPr>
-          <a:lstStyle/>
-          <a:p>
-            <a:pPr marL="265113" marR="0" lvl="0" indent="-265113" algn="l" defTabSz="914400" rtl="0" eaLnBrk="1" fontAlgn="ctr" latinLnBrk="0" hangingPunct="1">
-              <a:lnSpc>
-                <a:spcPct val="100000"/>
-              </a:lnSpc>
-              <a:spcBef>
-                <a:spcPct val="25000"/>
-              </a:spcBef>
-              <a:spcAft>
-                <a:spcPct val="0"/>
-              </a:spcAft>
-              <a:buClr>
-                <a:schemeClr val="accent1"/>
-              </a:buClr>
-              <a:buSzPct val="125000"/>
-              <a:buFont typeface="Wingdings" pitchFamily="2" charset="2"/>
-              <a:buChar char="§"/>
-              <a:tabLst/>
-              <a:defRPr/>
-            </a:pPr>
-            <a:r>
-              <a:rPr lang="en-US" sz="1800" b="0" kern="0" dirty="0" smtClean="0">
-                <a:latin typeface="+mn-lt"/>
-                <a:ea typeface="+mn-ea"/>
-              </a:rPr>
-              <a:t>Architecture:</a:t>
-            </a:r>
-          </a:p>
-          <a:p>
-            <a:pPr marL="722313" lvl="1" indent="-265113" algn="l" fontAlgn="ctr">
-              <a:spcBef>
-                <a:spcPct val="25000"/>
-              </a:spcBef>
-              <a:buClr>
-                <a:schemeClr val="accent1"/>
-              </a:buClr>
-              <a:buSzPct val="125000"/>
-              <a:buFont typeface="Wingdings" pitchFamily="2" charset="2"/>
-              <a:buChar char="§"/>
-            </a:pPr>
-            <a:r>
-              <a:rPr lang="en-US" sz="1800" b="0" kern="0" dirty="0" err="1" smtClean="0">
-                <a:latin typeface="+mn-lt"/>
-                <a:ea typeface="+mn-ea"/>
-              </a:rPr>
-              <a:t>Ouverture</a:t>
-            </a:r>
-            <a:r>
-              <a:rPr lang="en-US" sz="1800" b="0" kern="0" dirty="0" smtClean="0">
-                <a:latin typeface="+mn-lt"/>
-                <a:ea typeface="+mn-ea"/>
-              </a:rPr>
-              <a:t> </a:t>
-            </a:r>
-            <a:r>
-              <a:rPr lang="en-US" sz="1800" b="0" kern="0" dirty="0" err="1" smtClean="0">
-                <a:latin typeface="+mn-lt"/>
-                <a:ea typeface="+mn-ea"/>
-              </a:rPr>
-              <a:t>d’une</a:t>
-            </a:r>
-            <a:r>
-              <a:rPr lang="en-US" sz="1800" b="0" kern="0" dirty="0" smtClean="0">
-                <a:latin typeface="+mn-lt"/>
-                <a:ea typeface="+mn-ea"/>
-              </a:rPr>
-              <a:t> </a:t>
-            </a:r>
-            <a:r>
-              <a:rPr lang="en-US" sz="1800" b="0" kern="0" dirty="0" err="1" smtClean="0">
-                <a:latin typeface="+mn-lt"/>
-                <a:ea typeface="+mn-ea"/>
-              </a:rPr>
-              <a:t>connexion</a:t>
-            </a:r>
-            <a:r>
-              <a:rPr lang="en-US" sz="1800" b="0" kern="0" dirty="0" smtClean="0">
-                <a:latin typeface="+mn-lt"/>
-                <a:ea typeface="+mn-ea"/>
-              </a:rPr>
-              <a:t> </a:t>
-            </a:r>
-            <a:r>
-              <a:rPr lang="en-US" sz="1800" b="0" kern="0" dirty="0" err="1" smtClean="0">
-                <a:latin typeface="+mn-lt"/>
-                <a:ea typeface="+mn-ea"/>
-              </a:rPr>
-              <a:t>WebSocket</a:t>
-            </a:r>
-            <a:r>
-              <a:rPr lang="en-US" sz="1800" b="0" kern="0" dirty="0" smtClean="0">
-                <a:latin typeface="+mn-lt"/>
-                <a:ea typeface="+mn-ea"/>
-              </a:rPr>
-              <a:t> avec le server</a:t>
-            </a:r>
-            <a:endParaRPr lang="en-US" sz="1800" b="0" kern="0" dirty="0" smtClean="0">
-              <a:latin typeface="+mn-lt"/>
-              <a:ea typeface="+mn-ea"/>
-            </a:endParaRPr>
-          </a:p>
-          <a:p>
-            <a:pPr marL="722313" lvl="1" indent="-265113" algn="l" fontAlgn="ctr">
-              <a:spcBef>
-                <a:spcPct val="25000"/>
-              </a:spcBef>
-              <a:buClr>
-                <a:schemeClr val="accent1"/>
-              </a:buClr>
-              <a:buSzPct val="125000"/>
-              <a:buFont typeface="Wingdings" pitchFamily="2" charset="2"/>
-              <a:buChar char="§"/>
-            </a:pPr>
-            <a:r>
-              <a:rPr lang="en-US" sz="1800" b="0" kern="0" dirty="0" err="1" smtClean="0">
-                <a:latin typeface="+mn-lt"/>
-                <a:ea typeface="+mn-ea"/>
-              </a:rPr>
-              <a:t>Écoute</a:t>
-            </a:r>
-            <a:r>
-              <a:rPr lang="en-US" sz="1800" b="0" kern="0" dirty="0" smtClean="0">
-                <a:latin typeface="+mn-lt"/>
-                <a:ea typeface="+mn-ea"/>
-              </a:rPr>
-              <a:t> de </a:t>
-            </a:r>
-            <a:r>
-              <a:rPr lang="en-US" sz="1800" b="0" kern="0" dirty="0" err="1" smtClean="0">
-                <a:latin typeface="+mn-lt"/>
-                <a:ea typeface="+mn-ea"/>
-              </a:rPr>
-              <a:t>WebSocket</a:t>
-            </a:r>
-            <a:r>
-              <a:rPr lang="en-US" sz="1800" b="0" kern="0" dirty="0" smtClean="0">
-                <a:latin typeface="+mn-lt"/>
-                <a:ea typeface="+mn-ea"/>
-              </a:rPr>
-              <a:t> messages</a:t>
-            </a:r>
-            <a:endParaRPr lang="en-US" sz="1800" b="0" kern="0" dirty="0" smtClean="0">
-              <a:latin typeface="+mn-lt"/>
-              <a:ea typeface="+mn-ea"/>
-            </a:endParaRPr>
-          </a:p>
-          <a:p>
-            <a:pPr marL="722313" lvl="1" indent="-265113" algn="l" fontAlgn="ctr">
-              <a:spcBef>
-                <a:spcPct val="25000"/>
-              </a:spcBef>
-              <a:buClr>
-                <a:schemeClr val="accent1"/>
-              </a:buClr>
-              <a:buSzPct val="125000"/>
-              <a:buFont typeface="Wingdings" pitchFamily="2" charset="2"/>
-              <a:buChar char="§"/>
-            </a:pPr>
-            <a:r>
-              <a:rPr lang="en-US" sz="1800" b="0" kern="0" dirty="0" err="1" smtClean="0">
-                <a:latin typeface="+mn-lt"/>
-                <a:ea typeface="+mn-ea"/>
-              </a:rPr>
-              <a:t>Mise</a:t>
-            </a:r>
-            <a:r>
-              <a:rPr lang="en-US" sz="1800" b="0" kern="0" dirty="0" smtClean="0">
-                <a:latin typeface="+mn-lt"/>
-                <a:ea typeface="+mn-ea"/>
-              </a:rPr>
-              <a:t> à jour des </a:t>
-            </a:r>
-            <a:r>
-              <a:rPr lang="en-US" sz="1800" b="0" kern="0" dirty="0" err="1" smtClean="0">
-                <a:latin typeface="+mn-lt"/>
-                <a:ea typeface="+mn-ea"/>
-              </a:rPr>
-              <a:t>graphes</a:t>
-            </a:r>
-            <a:r>
-              <a:rPr lang="en-US" sz="1800" b="0" kern="0" dirty="0" smtClean="0">
-                <a:latin typeface="+mn-lt"/>
-                <a:ea typeface="+mn-ea"/>
-              </a:rPr>
-              <a:t> </a:t>
-            </a:r>
-            <a:r>
-              <a:rPr lang="en-US" sz="1800" b="0" kern="0" dirty="0" err="1" smtClean="0">
-                <a:latin typeface="+mn-lt"/>
-                <a:ea typeface="+mn-ea"/>
-              </a:rPr>
-              <a:t>selon</a:t>
-            </a:r>
-            <a:r>
-              <a:rPr lang="en-US" sz="1800" b="0" kern="0" dirty="0" smtClean="0">
-                <a:latin typeface="+mn-lt"/>
-                <a:ea typeface="+mn-ea"/>
-              </a:rPr>
-              <a:t> le message </a:t>
-            </a:r>
-            <a:r>
-              <a:rPr lang="en-US" sz="1800" b="0" kern="0" dirty="0" err="1" smtClean="0">
-                <a:latin typeface="+mn-lt"/>
-                <a:ea typeface="+mn-ea"/>
-              </a:rPr>
-              <a:t>reçu</a:t>
-            </a:r>
-            <a:endParaRPr lang="en-US" sz="1800" b="0" kern="0" dirty="0" smtClean="0">
-              <a:latin typeface="+mn-lt"/>
-              <a:ea typeface="+mn-ea"/>
-            </a:endParaRPr>
-          </a:p>
-          <a:p>
-            <a:pPr marL="722313" lvl="1" indent="-265113" algn="l" fontAlgn="ctr">
-              <a:spcBef>
-                <a:spcPct val="25000"/>
-              </a:spcBef>
-              <a:buClr>
-                <a:schemeClr val="accent1"/>
-              </a:buClr>
-              <a:buSzPct val="125000"/>
-              <a:buFont typeface="Wingdings" pitchFamily="2" charset="2"/>
-              <a:buChar char="§"/>
-            </a:pPr>
-            <a:endParaRPr kumimoji="0" lang="en-US" sz="1800" b="0" i="0" u="none" strike="noStrike" kern="0" cap="none" spc="0" normalizeH="0" baseline="0" noProof="0" dirty="0">
-              <a:ln>
-                <a:noFill/>
-              </a:ln>
-              <a:solidFill>
-                <a:srgbClr val="000000"/>
-              </a:solidFill>
-              <a:effectLst/>
-              <a:uLnTx/>
-              <a:uFillTx/>
-              <a:latin typeface="+mn-lt"/>
-              <a:ea typeface="+mn-ea"/>
-              <a:cs typeface="+mn-cs"/>
-            </a:endParaRPr>
-          </a:p>
-        </p:txBody>
-      </p:sp>
-      <p:pic>
-        <p:nvPicPr>
-          <p:cNvPr id="1027" name="Picture 3" descr="C:\Users\samux\Desktop\ARM-internship-report\report\dashboard_acc_env.jpg"/>
-          <p:cNvPicPr>
-            <a:picLocks noChangeAspect="1" noChangeArrowheads="1"/>
-          </p:cNvPicPr>
-          <p:nvPr/>
-        </p:nvPicPr>
-        <p:blipFill>
-          <a:blip r:embed="rId2"/>
-          <a:srcRect/>
-          <a:stretch>
-            <a:fillRect/>
-          </a:stretch>
-        </p:blipFill>
-        <p:spPr bwMode="auto">
-          <a:xfrm>
-            <a:off x="217796" y="1398495"/>
-            <a:ext cx="3766213" cy="4738500"/>
+            <a:off x="1338395" y="1469163"/>
+            <a:ext cx="3147932" cy="2367113"/>
           </a:xfrm>
           <a:prstGeom prst="rect">
             <a:avLst/>
@@ -4314,7 +4270,34 @@
       </p:grpSpPr>
       <p:sp>
         <p:nvSpPr>
-          <p:cNvPr id="2" name="Titre 1"/>
+          <p:cNvPr id="3" name="Espace réservé du contenu 2"/>
+          <p:cNvSpPr>
+            <a:spLocks noGrp="1"/>
+          </p:cNvSpPr>
+          <p:nvPr>
+            <p:ph idx="1"/>
+          </p:nvPr>
+        </p:nvSpPr>
+        <p:spPr/>
+        <p:txBody>
+          <a:bodyPr/>
+          <a:lstStyle/>
+          <a:p>
+            <a:r>
+              <a:rPr lang="en-US" dirty="0" err="1" smtClean="0"/>
+              <a:t>Navigateurs</a:t>
+            </a:r>
+            <a:r>
+              <a:rPr lang="en-US" dirty="0" smtClean="0"/>
+              <a:t>:</a:t>
+            </a:r>
+            <a:endParaRPr lang="en-US" dirty="0"/>
+          </a:p>
+        </p:txBody>
+      </p:sp>
+      <p:sp>
+        <p:nvSpPr>
+          <p:cNvPr id="4" name="Espace réservé du contenu 2"/>
           <p:cNvSpPr>
             <a:spLocks noGrp="1"/>
           </p:cNvSpPr>
@@ -4357,256 +4340,295 @@
       </p:sp>
       <p:sp>
         <p:nvSpPr>
-          <p:cNvPr id="3" name="Espace réservé du contenu 2"/>
-          <p:cNvSpPr>
-            <a:spLocks noGrp="1"/>
+          <p:cNvPr id="6" name="Espace réservé du contenu 2"/>
+          <p:cNvSpPr txBox="1">
+            <a:spLocks/>
           </p:cNvSpPr>
-          <p:nvPr>
-            <p:ph idx="1"/>
-          </p:nvPr>
+          <p:nvPr/>
         </p:nvSpPr>
-        <p:spPr>
+        <p:spPr bwMode="auto">
           <a:xfrm>
-            <a:off x="196467" y="1778821"/>
-            <a:ext cx="8775700" cy="3203082"/>
+            <a:off x="4151709" y="2393266"/>
+            <a:ext cx="4992291" cy="1345326"/>
           </a:xfrm>
+          <a:prstGeom prst="rect">
+            <a:avLst/>
+          </a:prstGeom>
+          <a:noFill/>
+          <a:ln w="9525">
+            <a:noFill/>
+            <a:miter lim="800000"/>
+            <a:headEnd/>
+            <a:tailEnd/>
+          </a:ln>
+          <a:effectLst/>
         </p:spPr>
         <p:txBody>
-          <a:bodyPr/>
+          <a:bodyPr vert="horz" wrap="square" lIns="91440" tIns="45720" rIns="91440" bIns="45720" numCol="1" anchor="t" anchorCtr="0" compatLnSpc="1">
+            <a:prstTxWarp prst="textNoShape">
+              <a:avLst/>
+            </a:prstTxWarp>
+          </a:bodyPr>
           <a:lstStyle/>
           <a:p>
-            <a:r>
-              <a:rPr lang="en-US" dirty="0" smtClean="0"/>
-              <a:t>Server </a:t>
-            </a:r>
-            <a:r>
-              <a:rPr lang="en-US" dirty="0" err="1" smtClean="0"/>
+            <a:pPr marL="265113" marR="0" lvl="0" indent="-265113" algn="l" defTabSz="914400" rtl="0" eaLnBrk="1" fontAlgn="ctr" latinLnBrk="0" hangingPunct="1">
+              <a:lnSpc>
+                <a:spcPct val="100000"/>
+              </a:lnSpc>
+              <a:spcBef>
+                <a:spcPct val="25000"/>
+              </a:spcBef>
+              <a:spcAft>
+                <a:spcPct val="0"/>
+              </a:spcAft>
+              <a:buClr>
+                <a:schemeClr val="accent1"/>
+              </a:buClr>
+              <a:buSzPct val="125000"/>
+              <a:buFont typeface="Wingdings" pitchFamily="2" charset="2"/>
+              <a:buChar char="§"/>
+              <a:tabLst/>
+              <a:defRPr/>
+            </a:pPr>
+            <a:r>
+              <a:rPr lang="en-US" sz="1800" b="0" kern="0" dirty="0" smtClean="0">
+                <a:latin typeface="+mn-lt"/>
+                <a:ea typeface="+mn-ea"/>
+              </a:rPr>
+              <a:t>Architecture:</a:t>
+            </a:r>
+          </a:p>
+          <a:p>
+            <a:pPr marL="722313" lvl="1" indent="-265113" algn="l" fontAlgn="ctr">
+              <a:spcBef>
+                <a:spcPct val="25000"/>
+              </a:spcBef>
+              <a:buClr>
+                <a:schemeClr val="accent1"/>
+              </a:buClr>
+              <a:buSzPct val="125000"/>
+              <a:buFont typeface="Wingdings" pitchFamily="2" charset="2"/>
+              <a:buChar char="§"/>
+            </a:pPr>
+            <a:r>
+              <a:rPr lang="en-US" sz="1800" b="0" kern="0" dirty="0" err="1" smtClean="0">
+                <a:latin typeface="+mn-lt"/>
+                <a:ea typeface="+mn-ea"/>
+              </a:rPr>
+              <a:t>Ouverture</a:t>
+            </a:r>
+            <a:r>
+              <a:rPr lang="en-US" sz="1800" b="0" kern="0" dirty="0" smtClean="0">
+                <a:latin typeface="+mn-lt"/>
+                <a:ea typeface="+mn-ea"/>
+              </a:rPr>
+              <a:t> </a:t>
+            </a:r>
+            <a:r>
+              <a:rPr lang="en-US" sz="1800" b="0" kern="0" dirty="0" err="1" smtClean="0">
+                <a:latin typeface="+mn-lt"/>
+                <a:ea typeface="+mn-ea"/>
+              </a:rPr>
+              <a:t>d’une</a:t>
+            </a:r>
+            <a:r>
+              <a:rPr lang="en-US" sz="1800" b="0" kern="0" dirty="0" smtClean="0">
+                <a:latin typeface="+mn-lt"/>
+                <a:ea typeface="+mn-ea"/>
+              </a:rPr>
+              <a:t> </a:t>
+            </a:r>
+            <a:r>
+              <a:rPr lang="en-US" sz="1800" b="0" kern="0" dirty="0" err="1" smtClean="0">
+                <a:latin typeface="+mn-lt"/>
+                <a:ea typeface="+mn-ea"/>
+              </a:rPr>
+              <a:t>connexion</a:t>
+            </a:r>
+            <a:r>
+              <a:rPr lang="en-US" sz="1800" b="0" kern="0" dirty="0" smtClean="0">
+                <a:latin typeface="+mn-lt"/>
+                <a:ea typeface="+mn-ea"/>
+              </a:rPr>
+              <a:t> </a:t>
+            </a:r>
+            <a:r>
+              <a:rPr lang="en-US" sz="1800" b="0" kern="0" dirty="0" err="1" smtClean="0">
+                <a:latin typeface="+mn-lt"/>
+                <a:ea typeface="+mn-ea"/>
+              </a:rPr>
               <a:t>WebSocket</a:t>
             </a:r>
             <a:r>
-              <a:rPr lang="en-US" dirty="0" smtClean="0"/>
-              <a:t>:</a:t>
-            </a:r>
-            <a:endParaRPr lang="en-US" dirty="0" smtClean="0"/>
-          </a:p>
-          <a:p>
-            <a:pPr lvl="1"/>
-            <a:r>
-              <a:rPr lang="en-US" dirty="0" err="1" smtClean="0"/>
-              <a:t>Basée</a:t>
-            </a:r>
-            <a:r>
-              <a:rPr lang="en-US" dirty="0" smtClean="0"/>
+              <a:rPr lang="en-US" sz="1800" b="0" kern="0" dirty="0" smtClean="0">
+                <a:latin typeface="+mn-lt"/>
+                <a:ea typeface="+mn-ea"/>
+              </a:rPr>
+              <a:t> avec le server</a:t>
+            </a:r>
+          </a:p>
+          <a:p>
+            <a:pPr marL="722313" lvl="1" indent="-265113" algn="l" fontAlgn="ctr">
+              <a:spcBef>
+                <a:spcPct val="25000"/>
+              </a:spcBef>
+              <a:buClr>
+                <a:schemeClr val="accent1"/>
+              </a:buClr>
+              <a:buSzPct val="125000"/>
+              <a:buFont typeface="Wingdings" pitchFamily="2" charset="2"/>
+              <a:buChar char="§"/>
+            </a:pPr>
+            <a:r>
+              <a:rPr lang="en-US" sz="1800" b="0" kern="0" dirty="0" err="1" smtClean="0">
+                <a:latin typeface="+mn-lt"/>
+                <a:ea typeface="+mn-ea"/>
+              </a:rPr>
+              <a:t>Écoute</a:t>
+            </a:r>
+            <a:r>
+              <a:rPr lang="en-US" sz="1800" b="0" kern="0" dirty="0" smtClean="0">
+                <a:latin typeface="+mn-lt"/>
+                <a:ea typeface="+mn-ea"/>
+              </a:rPr>
+              <a:t> de </a:t>
+            </a:r>
+            <a:r>
+              <a:rPr lang="en-US" sz="1800" b="0" kern="0" dirty="0" err="1" smtClean="0">
+                <a:latin typeface="+mn-lt"/>
+                <a:ea typeface="+mn-ea"/>
+              </a:rPr>
+              <a:t>WebSocket</a:t>
+            </a:r>
+            <a:r>
+              <a:rPr lang="en-US" sz="1800" b="0" kern="0" dirty="0" smtClean="0">
+                <a:latin typeface="+mn-lt"/>
+                <a:ea typeface="+mn-ea"/>
+              </a:rPr>
+              <a:t> messages</a:t>
+            </a:r>
+          </a:p>
+          <a:p>
+            <a:pPr marL="722313" lvl="1" indent="-265113" algn="l" fontAlgn="ctr">
+              <a:spcBef>
+                <a:spcPct val="25000"/>
+              </a:spcBef>
+              <a:buClr>
+                <a:schemeClr val="accent1"/>
+              </a:buClr>
+              <a:buSzPct val="125000"/>
+              <a:buFont typeface="Wingdings" pitchFamily="2" charset="2"/>
+              <a:buChar char="§"/>
+            </a:pPr>
+            <a:r>
+              <a:rPr lang="en-US" sz="1800" b="0" kern="0" dirty="0" err="1" smtClean="0">
+                <a:latin typeface="+mn-lt"/>
+                <a:ea typeface="+mn-ea"/>
+              </a:rPr>
+              <a:t>Mise</a:t>
+            </a:r>
+            <a:r>
+              <a:rPr lang="en-US" sz="1800" b="0" kern="0" dirty="0" smtClean="0">
+                <a:latin typeface="+mn-lt"/>
+                <a:ea typeface="+mn-ea"/>
+              </a:rPr>
+              <a:t> à jour des </a:t>
+            </a:r>
+            <a:r>
+              <a:rPr lang="en-US" sz="1800" b="0" kern="0" dirty="0" err="1" smtClean="0">
+                <a:latin typeface="+mn-lt"/>
+                <a:ea typeface="+mn-ea"/>
+              </a:rPr>
+              <a:t>graphes</a:t>
+            </a:r>
+            <a:r>
+              <a:rPr lang="en-US" sz="1800" b="0" kern="0" dirty="0" smtClean="0">
+                <a:latin typeface="+mn-lt"/>
+                <a:ea typeface="+mn-ea"/>
+              </a:rPr>
               <a:t> </a:t>
             </a:r>
             <a:r>
-              <a:rPr lang="en-US" dirty="0" err="1" smtClean="0"/>
-              <a:t>sur</a:t>
-            </a:r>
-            <a:r>
-              <a:rPr lang="en-US" dirty="0" smtClean="0"/>
-              <a:t> le </a:t>
-            </a:r>
-            <a:r>
-              <a:rPr lang="en-US" dirty="0" err="1" smtClean="0"/>
-              <a:t>webserver</a:t>
-            </a:r>
-            <a:r>
-              <a:rPr lang="en-US" dirty="0" smtClean="0"/>
-              <a:t> Tornado</a:t>
-            </a:r>
-            <a:endParaRPr lang="en-US" dirty="0" smtClean="0"/>
-          </a:p>
-          <a:p>
-            <a:pPr lvl="1"/>
-            <a:r>
-              <a:rPr lang="fr-FR" i="1" dirty="0" smtClean="0"/>
-              <a:t>ws://sockets.mbed.org/ws/</a:t>
-            </a:r>
-            <a:r>
-              <a:rPr lang="fr-FR" i="1" dirty="0" smtClean="0">
-                <a:solidFill>
-                  <a:srgbClr val="FF0000"/>
-                </a:solidFill>
+              <a:rPr lang="en-US" sz="1800" b="0" kern="0" dirty="0" err="1" smtClean="0">
+                <a:latin typeface="+mn-lt"/>
+                <a:ea typeface="+mn-ea"/>
               </a:rPr>
-              <a:t>&lt;channel&gt;</a:t>
-            </a:r>
-            <a:r>
-              <a:rPr lang="fr-FR" i="1" dirty="0" smtClean="0"/>
-              <a:t>/</a:t>
-            </a:r>
-            <a:r>
-              <a:rPr lang="fr-FR" i="1" dirty="0" smtClean="0">
-                <a:solidFill>
-                  <a:schemeClr val="accent3"/>
-                </a:solidFill>
+              <a:t>selon</a:t>
+            </a:r>
+            <a:r>
+              <a:rPr lang="en-US" sz="1800" b="0" kern="0" dirty="0" smtClean="0">
+                <a:latin typeface="+mn-lt"/>
+                <a:ea typeface="+mn-ea"/>
               </a:rPr>
-              <a:t>&lt;mode&gt;</a:t>
-            </a:r>
-            <a:endParaRPr lang="en-US" i="1" dirty="0" smtClean="0">
+              <a:t> le message </a:t>
+            </a:r>
+            <a:r>
+              <a:rPr lang="en-US" sz="1800" b="0" kern="0" dirty="0" err="1" smtClean="0">
+                <a:latin typeface="+mn-lt"/>
+                <a:ea typeface="+mn-ea"/>
+              </a:rPr>
+              <a:t>reçu</a:t>
+            </a:r>
+            <a:endParaRPr lang="en-US" sz="1800" b="0" kern="0" dirty="0" smtClean="0">
+              <a:latin typeface="+mn-lt"/>
+              <a:ea typeface="+mn-ea"/>
+            </a:endParaRPr>
+          </a:p>
+          <a:p>
+            <a:pPr marL="722313" lvl="1" indent="-265113" algn="l" fontAlgn="ctr">
+              <a:spcBef>
+                <a:spcPct val="25000"/>
+              </a:spcBef>
+              <a:buClr>
+                <a:schemeClr val="accent1"/>
+              </a:buClr>
+              <a:buSzPct val="125000"/>
+              <a:buFont typeface="Wingdings" pitchFamily="2" charset="2"/>
+              <a:buChar char="§"/>
+            </a:pPr>
+            <a:endParaRPr kumimoji="0" lang="en-US" sz="1800" b="0" i="0" u="none" strike="noStrike" kern="0" cap="none" spc="0" normalizeH="0" baseline="0" noProof="0" dirty="0">
+              <a:ln>
+                <a:noFill/>
+              </a:ln>
               <a:solidFill>
-                <a:schemeClr val="accent3"/>
+                <a:srgbClr val="000000"/>
               </a:solidFill>
+              <a:effectLst/>
+              <a:uLnTx/>
+              <a:uFillTx/>
+              <a:latin typeface="+mn-lt"/>
+              <a:ea typeface="+mn-ea"/>
+              <a:cs typeface="+mn-cs"/>
             </a:endParaRPr>
-          </a:p>
-          <a:p>
-            <a:pPr lvl="1"/>
-            <a:r>
-              <a:rPr lang="en-US" dirty="0" smtClean="0"/>
-              <a:t>Un client </a:t>
-            </a:r>
-            <a:r>
-              <a:rPr lang="en-US" dirty="0" err="1" smtClean="0"/>
-              <a:t>est</a:t>
-            </a:r>
-            <a:r>
-              <a:rPr lang="en-US" dirty="0" smtClean="0"/>
-              <a:t> </a:t>
-            </a:r>
-            <a:r>
-              <a:rPr lang="en-US" dirty="0" err="1" smtClean="0"/>
-              <a:t>connecté</a:t>
-            </a:r>
-            <a:r>
-              <a:rPr lang="en-US" dirty="0" smtClean="0"/>
-              <a:t> à </a:t>
-            </a:r>
-            <a:r>
-              <a:rPr lang="en-US" dirty="0" err="1" smtClean="0"/>
-              <a:t>travers</a:t>
-            </a:r>
-            <a:r>
-              <a:rPr lang="en-US" dirty="0" smtClean="0"/>
-              <a:t> un “</a:t>
-            </a:r>
-            <a:r>
-              <a:rPr lang="en-US" b="1" dirty="0" smtClean="0"/>
-              <a:t>channel</a:t>
-            </a:r>
-            <a:r>
-              <a:rPr lang="en-US" dirty="0" smtClean="0"/>
-              <a:t>”</a:t>
-            </a:r>
-          </a:p>
-          <a:p>
-            <a:pPr lvl="1"/>
-            <a:r>
-              <a:rPr lang="en-US" dirty="0" smtClean="0"/>
-              <a:t>Au </a:t>
-            </a:r>
-            <a:r>
-              <a:rPr lang="en-US" dirty="0" err="1" smtClean="0"/>
-              <a:t>sein</a:t>
-            </a:r>
-            <a:r>
-              <a:rPr lang="en-US" dirty="0" smtClean="0"/>
-              <a:t> d’un </a:t>
-            </a:r>
-            <a:r>
-              <a:rPr lang="en-US" dirty="0" err="1" smtClean="0"/>
-              <a:t>même</a:t>
-            </a:r>
-            <a:r>
-              <a:rPr lang="en-US" dirty="0" smtClean="0"/>
-              <a:t> channel, des messages </a:t>
-            </a:r>
-            <a:r>
-              <a:rPr lang="en-US" dirty="0" err="1" smtClean="0"/>
-              <a:t>peuvent</a:t>
-            </a:r>
-            <a:r>
-              <a:rPr lang="en-US" dirty="0" smtClean="0"/>
-              <a:t> </a:t>
-            </a:r>
-            <a:r>
-              <a:rPr lang="en-US" dirty="0" err="1" smtClean="0"/>
-              <a:t>être</a:t>
-            </a:r>
-            <a:r>
-              <a:rPr lang="en-US" dirty="0" smtClean="0"/>
-              <a:t> </a:t>
-            </a:r>
-            <a:r>
-              <a:rPr lang="en-US" dirty="0" err="1" smtClean="0"/>
-              <a:t>échangés</a:t>
-            </a:r>
-            <a:r>
-              <a:rPr lang="en-US" dirty="0" smtClean="0"/>
-              <a:t> </a:t>
-            </a:r>
-            <a:r>
-              <a:rPr lang="en-US" dirty="0" err="1" smtClean="0"/>
-              <a:t>selon</a:t>
-            </a:r>
-            <a:r>
-              <a:rPr lang="en-US" dirty="0" smtClean="0"/>
-              <a:t> un “</a:t>
-            </a:r>
-            <a:r>
-              <a:rPr lang="en-US" b="1" dirty="0" smtClean="0"/>
-              <a:t>mode de </a:t>
-            </a:r>
-            <a:r>
-              <a:rPr lang="en-US" b="1" dirty="0" err="1" smtClean="0"/>
-              <a:t>connexion</a:t>
-            </a:r>
-            <a:r>
-              <a:rPr lang="en-US" dirty="0" smtClean="0"/>
-              <a:t>”:</a:t>
-            </a:r>
-            <a:endParaRPr lang="en-US" dirty="0" smtClean="0"/>
-          </a:p>
-          <a:p>
-            <a:pPr lvl="2"/>
-            <a:r>
-              <a:rPr lang="en-US" dirty="0" smtClean="0"/>
-              <a:t>Write-Only (</a:t>
-            </a:r>
-            <a:r>
-              <a:rPr lang="en-US" dirty="0" err="1" smtClean="0"/>
-              <a:t>wo</a:t>
-            </a:r>
-            <a:r>
-              <a:rPr lang="en-US" dirty="0" smtClean="0"/>
-              <a:t>)</a:t>
-            </a:r>
-          </a:p>
-          <a:p>
-            <a:pPr lvl="2"/>
-            <a:r>
-              <a:rPr lang="en-US" dirty="0" smtClean="0"/>
-              <a:t>Read-Only (</a:t>
-            </a:r>
-            <a:r>
-              <a:rPr lang="en-US" dirty="0" err="1" smtClean="0"/>
-              <a:t>ro</a:t>
-            </a:r>
-            <a:r>
-              <a:rPr lang="en-US" dirty="0" smtClean="0"/>
-              <a:t>)</a:t>
-            </a:r>
-          </a:p>
-          <a:p>
-            <a:pPr lvl="2"/>
-            <a:r>
-              <a:rPr lang="en-US" dirty="0" smtClean="0"/>
-              <a:t>Read-Write (</a:t>
-            </a:r>
-            <a:r>
-              <a:rPr lang="en-US" dirty="0" err="1" smtClean="0"/>
-              <a:t>rw</a:t>
-            </a:r>
-            <a:r>
-              <a:rPr lang="en-US" dirty="0" smtClean="0"/>
-              <a:t>)</a:t>
-            </a:r>
-          </a:p>
-          <a:p>
-            <a:pPr lvl="1"/>
-            <a:endParaRPr lang="en-US" dirty="0"/>
           </a:p>
         </p:txBody>
       </p:sp>
+      <p:pic>
+        <p:nvPicPr>
+          <p:cNvPr id="1027" name="Picture 3" descr="C:\Users\samux\Desktop\ARM-internship-report\report\dashboard_acc_env.jpg"/>
+          <p:cNvPicPr>
+            <a:picLocks noChangeAspect="1" noChangeArrowheads="1"/>
+          </p:cNvPicPr>
+          <p:nvPr/>
+        </p:nvPicPr>
+        <p:blipFill>
+          <a:blip r:embed="rId2"/>
+          <a:srcRect/>
+          <a:stretch>
+            <a:fillRect/>
+          </a:stretch>
+        </p:blipFill>
+        <p:spPr bwMode="auto">
+          <a:xfrm>
+            <a:off x="217796" y="1398495"/>
+            <a:ext cx="3766213" cy="4738500"/>
+          </a:xfrm>
+          <a:prstGeom prst="rect">
+            <a:avLst/>
+          </a:prstGeom>
+          <a:noFill/>
+        </p:spPr>
+      </p:pic>
     </p:spTree>
   </p:cSld>
   <p:clrMapOvr>
@@ -4816,7 +4838,11 @@
             <a:pPr algn="ctr"/>
             <a:r>
               <a:rPr lang="en-US" dirty="0" smtClean="0"/>
-              <a:t>Universal Serial Bus: Device</a:t>
+              <a:t>Universal Serial Bus: </a:t>
+            </a:r>
+            <a:r>
+              <a:rPr lang="en-US" dirty="0" smtClean="0"/>
+              <a:t>USB Device</a:t>
             </a:r>
             <a:endParaRPr lang="en-US" dirty="0"/>
           </a:p>
@@ -5286,20 +5312,6 @@
               </a:rPr>
               <a:t>: </a:t>
             </a:r>
-            <a:endParaRPr kumimoji="0" lang="en-US" sz="2400" b="0" i="0" u="none" strike="noStrike" kern="0" cap="none" spc="0" normalizeH="0" baseline="0" noProof="0" dirty="0" smtClean="0">
-              <a:ln>
-                <a:noFill/>
-              </a:ln>
-              <a:solidFill>
-                <a:srgbClr val="000000"/>
-              </a:solidFill>
-              <a:effectLst/>
-              <a:uLnTx/>
-              <a:uFillTx/>
-              <a:latin typeface="+mn-lt"/>
-              <a:ea typeface="+mn-ea"/>
-              <a:cs typeface="+mn-cs"/>
-            </a:endParaRPr>
           </a:p>
           <a:p>
             <a:pPr marL="722313" lvl="1" indent="-265113" algn="l" fontAlgn="ctr">
@@ -5583,11 +5595,7 @@
           <a:p>
             <a:r>
               <a:rPr lang="en-US" dirty="0" smtClean="0"/>
-              <a:t>USB Device: </a:t>
-            </a:r>
-            <a:r>
-              <a:rPr lang="en-US" dirty="0" smtClean="0"/>
-              <a:t>Introduction</a:t>
+              <a:t>USB Device: Introduction</a:t>
             </a:r>
             <a:endParaRPr lang="en-US" dirty="0"/>
           </a:p>
@@ -5595,7 +5603,7 @@
       </p:sp>
       <p:pic>
         <p:nvPicPr>
-          <p:cNvPr id="3074" name="Picture 2" descr="C:\Users\samux\Desktop\ARM-internship-report\report\endpoints.jpg"/>
+          <p:cNvPr id="2050" name="Picture 2" descr="C:\Users\samux\Desktop\ARM-internship-report\presentation_fr\endpoints.png"/>
           <p:cNvPicPr>
             <a:picLocks noChangeAspect="1" noChangeArrowheads="1"/>
           </p:cNvPicPr>
@@ -5610,8 +5618,8 @@
         </p:blipFill>
         <p:spPr bwMode="auto">
           <a:xfrm>
-            <a:off x="571391" y="2218287"/>
-            <a:ext cx="7742181" cy="3882803"/>
+            <a:off x="726164" y="2238704"/>
+            <a:ext cx="7572451" cy="3797682"/>
           </a:xfrm>
           <a:prstGeom prst="rect">
             <a:avLst/>
@@ -5661,11 +5669,7 @@
           <a:p>
             <a:r>
               <a:rPr lang="en-US" dirty="0" smtClean="0"/>
-              <a:t>USB Device: </a:t>
-            </a:r>
-            <a:r>
-              <a:rPr lang="en-US" dirty="0" smtClean="0"/>
-              <a:t>Introduction</a:t>
+              <a:t>USB Device: Introduction</a:t>
             </a:r>
             <a:endParaRPr lang="en-US" dirty="0"/>
           </a:p>
@@ -5693,11 +5697,7 @@
           <a:p>
             <a:r>
               <a:rPr lang="en-US" b="1" dirty="0" err="1" smtClean="0"/>
-              <a:t>É</a:t>
-            </a:r>
-            <a:r>
-              <a:rPr lang="en-US" b="1" dirty="0" err="1" smtClean="0"/>
-              <a:t>numeration</a:t>
+              <a:t>Énumeration</a:t>
             </a:r>
             <a:r>
               <a:rPr lang="en-US" dirty="0" smtClean="0"/>
@@ -5862,11 +5862,7 @@
           <a:p>
             <a:r>
               <a:rPr lang="en-US" dirty="0" smtClean="0"/>
-              <a:t>USB Device: </a:t>
-            </a:r>
-            <a:r>
-              <a:rPr lang="en-US" dirty="0" smtClean="0"/>
-              <a:t>architecture</a:t>
+              <a:t>USB Device: architecture</a:t>
             </a:r>
             <a:endParaRPr lang="en-US" dirty="0"/>
           </a:p>
@@ -5922,7 +5918,6 @@
               <a:rPr lang="en-US" dirty="0" smtClean="0"/>
               <a:t>Abstraction du hardware</a:t>
             </a:r>
-            <a:endParaRPr lang="en-US" dirty="0" smtClean="0"/>
           </a:p>
           <a:p>
             <a:r>
@@ -6018,39 +6013,38 @@
               <a:rPr lang="en-US" dirty="0" smtClean="0"/>
               <a:t>:</a:t>
             </a:r>
+          </a:p>
+          <a:p>
+            <a:pPr lvl="1"/>
+            <a:r>
+              <a:rPr lang="en-US" dirty="0" smtClean="0"/>
+              <a:t>Pas de </a:t>
+            </a:r>
+            <a:r>
+              <a:rPr lang="en-US" dirty="0" err="1" smtClean="0"/>
+              <a:t>différence</a:t>
+            </a:r>
+            <a:r>
+              <a:rPr lang="en-US" dirty="0" smtClean="0"/>
+              <a:t> entre les </a:t>
+            </a:r>
+            <a:r>
+              <a:rPr lang="en-US" dirty="0" err="1" smtClean="0"/>
+              <a:t>deux</a:t>
+            </a:r>
+            <a:r>
+              <a:rPr lang="en-US" dirty="0" smtClean="0"/>
+              <a:t> </a:t>
+            </a:r>
+            <a:r>
+              <a:rPr lang="en-US" dirty="0" err="1" smtClean="0"/>
+              <a:t>mbeds</a:t>
+            </a:r>
             <a:endParaRPr lang="en-US" dirty="0" smtClean="0"/>
           </a:p>
           <a:p>
             <a:pPr lvl="1"/>
             <a:r>
-              <a:rPr lang="en-US" dirty="0" smtClean="0"/>
-              <a:t>Pas de </a:t>
-            </a:r>
-            <a:r>
-              <a:rPr lang="en-US" dirty="0" err="1" smtClean="0"/>
-              <a:t>différence</a:t>
-            </a:r>
-            <a:r>
-              <a:rPr lang="en-US" dirty="0" smtClean="0"/>
-              <a:t> entre les </a:t>
-            </a:r>
-            <a:r>
-              <a:rPr lang="en-US" dirty="0" err="1" smtClean="0"/>
-              <a:t>deux</a:t>
-            </a:r>
-            <a:r>
-              <a:rPr lang="en-US" dirty="0" smtClean="0"/>
-              <a:t> </a:t>
-            </a:r>
-            <a:r>
-              <a:rPr lang="en-US" dirty="0" err="1" smtClean="0"/>
-              <a:t>mbeds</a:t>
-            </a:r>
-            <a:endParaRPr lang="en-US" dirty="0" smtClean="0"/>
-          </a:p>
-          <a:p>
-            <a:pPr lvl="1"/>
-            <a:r>
               <a:rPr lang="en-US" dirty="0" err="1" smtClean="0"/>
               <a:t>Énumération</a:t>
             </a:r>
@@ -6058,7 +6052,6 @@
               <a:rPr lang="en-US" dirty="0" smtClean="0"/>
               <a:t>:</a:t>
             </a:r>
-            <a:endParaRPr lang="en-US" dirty="0" smtClean="0"/>
           </a:p>
           <a:p>
             <a:endParaRPr lang="en-US" dirty="0"/>
@@ -6067,7 +6060,7 @@
       </p:sp>
       <p:pic>
         <p:nvPicPr>
-          <p:cNvPr id="1026" name="Picture 2" descr="C:\Users\samux\Desktop\ARM-internship-report\report\setup_packets.jpg"/>
+          <p:cNvPr id="3074" name="Picture 2" descr="C:\Users\samux\Desktop\ARM-internship-report\presentation_fr\setup_packets.png"/>
           <p:cNvPicPr>
             <a:picLocks noChangeAspect="1" noChangeArrowheads="1"/>
           </p:cNvPicPr>
@@ -6082,8 +6075,8 @@
         </p:blipFill>
         <p:spPr bwMode="auto">
           <a:xfrm>
-            <a:off x="115610" y="2375346"/>
-            <a:ext cx="8926761" cy="3136078"/>
+            <a:off x="210206" y="2432720"/>
+            <a:ext cx="8765628" cy="3432052"/>
           </a:xfrm>
           <a:prstGeom prst="rect">
             <a:avLst/>
@@ -6362,15 +6355,7 @@
           <a:p>
             <a:r>
               <a:rPr lang="en-US" dirty="0" smtClean="0"/>
-              <a:t>Human Interface </a:t>
-            </a:r>
-            <a:r>
-              <a:rPr lang="en-US" dirty="0" smtClean="0"/>
-              <a:t>Device </a:t>
-            </a:r>
-            <a:r>
-              <a:rPr lang="en-US" dirty="0" smtClean="0"/>
-              <a:t>(HID):</a:t>
+              <a:t>Human Interface Device (HID):</a:t>
             </a:r>
           </a:p>
           <a:p>
@@ -6391,7 +6376,6 @@
               <a:rPr lang="en-US" dirty="0" smtClean="0"/>
               <a:t>, clavier, joystick</a:t>
             </a:r>
-            <a:endParaRPr lang="en-US" dirty="0" smtClean="0"/>
           </a:p>
           <a:p>
             <a:pPr lvl="1"/>
@@ -6565,7 +6549,6 @@
               <a:rPr lang="en-US" dirty="0" smtClean="0"/>
               <a:t>”</a:t>
             </a:r>
-            <a:endParaRPr lang="en-US" dirty="0" smtClean="0"/>
           </a:p>
           <a:p>
             <a:pPr lvl="2"/>
@@ -6579,11 +6562,7 @@
             </a:r>
             <a:r>
               <a:rPr lang="en-US" dirty="0" smtClean="0"/>
-              <a:t> de</a:t>
-            </a:r>
-            <a:r>
-              <a:rPr lang="en-US" dirty="0" smtClean="0"/>
-              <a:t> </a:t>
+              <a:t> de </a:t>
             </a:r>
             <a:r>
               <a:rPr lang="en-US" b="1" dirty="0" smtClean="0"/>
@@ -6775,15 +6754,7 @@
             </a:r>
             <a:r>
               <a:rPr lang="en-US" dirty="0" smtClean="0"/>
-              <a:t> </a:t>
-            </a:r>
-            <a:r>
-              <a:rPr lang="en-US" dirty="0" smtClean="0"/>
-              <a:t>USB </a:t>
-            </a:r>
-            <a:r>
-              <a:rPr lang="en-US" dirty="0" smtClean="0"/>
-              <a:t>HID</a:t>
+              <a:t> USB HID</a:t>
             </a:r>
             <a:endParaRPr lang="en-US" dirty="0"/>
           </a:p>
@@ -6825,7 +6796,6 @@
               <a:rPr lang="en-US" dirty="0" smtClean="0"/>
               <a:t>:</a:t>
             </a:r>
-            <a:endParaRPr lang="en-US" dirty="0" smtClean="0"/>
           </a:p>
           <a:p>
             <a:pPr lvl="1"/>
@@ -6843,11 +6813,7 @@
             </a:r>
             <a:r>
               <a:rPr lang="en-US" dirty="0" smtClean="0"/>
-              <a:t>: </a:t>
-            </a:r>
-            <a:r>
-              <a:rPr lang="en-US" dirty="0" smtClean="0"/>
-              <a:t>8bits</a:t>
+              <a:t>: 8bits</a:t>
             </a:r>
           </a:p>
           <a:p>
@@ -7255,7 +7221,6 @@
               <a:rPr lang="en-US" dirty="0" smtClean="0"/>
               <a:t>:</a:t>
             </a:r>
-            <a:endParaRPr lang="en-US" dirty="0" smtClean="0"/>
           </a:p>
           <a:p>
             <a:pPr lvl="1"/>
@@ -7269,7 +7234,7 @@
       </p:sp>
       <p:pic>
         <p:nvPicPr>
-          <p:cNvPr id="3074" name="Picture 2" descr="C:\Users\samux\Desktop\ARM-internship-report\report\audio_archi.jpg"/>
+          <p:cNvPr id="4098" name="Picture 2" descr="C:\Users\samux\Desktop\ARM-internship-report\presentation_fr\audio_archi.png"/>
           <p:cNvPicPr>
             <a:picLocks noChangeAspect="1" noChangeArrowheads="1"/>
           </p:cNvPicPr>
@@ -7284,8 +7249,8 @@
         </p:blipFill>
         <p:spPr bwMode="auto">
           <a:xfrm>
-            <a:off x="1091967" y="3328609"/>
-            <a:ext cx="6616065" cy="2711848"/>
+            <a:off x="338604" y="2594102"/>
+            <a:ext cx="8542637" cy="3501527"/>
           </a:xfrm>
           <a:prstGeom prst="rect">
             <a:avLst/>
@@ -7369,21 +7334,24 @@
               <a:rPr lang="en-US" dirty="0" smtClean="0"/>
               <a:t> des packets audio:</a:t>
             </a:r>
-            <a:endParaRPr lang="en-US" dirty="0" smtClean="0"/>
           </a:p>
           <a:p>
             <a:pPr lvl="1"/>
             <a:r>
               <a:rPr lang="en-US" dirty="0" smtClean="0"/>
-              <a:t>Durant le Start </a:t>
-            </a:r>
-            <a:r>
-              <a:rPr lang="en-US" dirty="0" smtClean="0"/>
-              <a:t>of </a:t>
-            </a:r>
-            <a:r>
-              <a:rPr lang="en-US" dirty="0" smtClean="0"/>
-              <a:t>Frame (SOF) </a:t>
+              <a:t>Durant le </a:t>
+            </a:r>
+            <a:r>
+              <a:rPr lang="en-US" b="1" dirty="0" smtClean="0"/>
+              <a:t>Start of </a:t>
+            </a:r>
+            <a:r>
+              <a:rPr lang="en-US" b="1" dirty="0" smtClean="0"/>
+              <a:t>Frame</a:t>
+            </a:r>
+            <a:r>
+              <a:rPr lang="en-US" dirty="0" smtClean="0"/>
+              <a:t> </a:t>
             </a:r>
             <a:r>
               <a:rPr lang="en-US" dirty="0" err="1" smtClean="0"/>
@@ -7489,14 +7457,7 @@
                 <a:latin typeface="Arial" pitchFamily="34" charset="0"/>
                 <a:cs typeface="Arial" pitchFamily="34" charset="0"/>
               </a:rPr>
-              <a:t>TAILLE PACKET AUDIO = </a:t>
-            </a:r>
-            <a:r>
-              <a:rPr lang="en-US" sz="1800" dirty="0" smtClean="0">
-                <a:latin typeface="Arial" pitchFamily="34" charset="0"/>
-                <a:cs typeface="Arial" pitchFamily="34" charset="0"/>
-              </a:rPr>
-              <a:t>(FREQ / 500) * </a:t>
+              <a:t>TAILLE PACKET AUDIO = (FREQ / 500) * </a:t>
             </a:r>
             <a:r>
               <a:rPr lang="en-US" sz="1800" dirty="0" err="1" smtClean="0">
@@ -7783,11 +7744,34 @@
           <a:p>
             <a:r>
               <a:rPr lang="en-US" dirty="0" smtClean="0"/>
-              <a:t>Internet </a:t>
-            </a:r>
-            <a:r>
-              <a:rPr lang="en-US" dirty="0" smtClean="0"/>
-              <a:t>des</a:t>
+              <a:t>Internet des </a:t>
+            </a:r>
+            <a:r>
+              <a:rPr lang="en-US" dirty="0" err="1" smtClean="0"/>
+              <a:t>Objets</a:t>
+            </a:r>
+            <a:r>
+              <a:rPr lang="en-US" dirty="0" smtClean="0"/>
+              <a:t>:</a:t>
+            </a:r>
+          </a:p>
+          <a:p>
+            <a:pPr lvl="1"/>
+            <a:r>
+              <a:rPr lang="en-US" dirty="0" smtClean="0"/>
+              <a:t>Introduction d’un nouveau standard d’HTML5 </a:t>
+            </a:r>
+            <a:r>
+              <a:rPr lang="en-US" dirty="0" err="1" smtClean="0"/>
+              <a:t>dans</a:t>
+            </a:r>
+            <a:r>
+              <a:rPr lang="en-US" dirty="0" smtClean="0"/>
+              <a:t> les </a:t>
+            </a:r>
+            <a:r>
+              <a:rPr lang="en-US" dirty="0" err="1" smtClean="0"/>
+              <a:t>systèmes</a:t>
             </a:r>
             <a:r>
               <a:rPr lang="en-US" dirty="0" smtClean="0"/>
@@ -7795,49 +7779,13 @@
             </a:r>
             <a:r>
               <a:rPr lang="en-US" dirty="0" err="1" smtClean="0"/>
-              <a:t>Objets</a:t>
-            </a:r>
-            <a:r>
-              <a:rPr lang="en-US" dirty="0" smtClean="0"/>
-              <a:t>:</a:t>
+              <a:t>embarqués</a:t>
             </a:r>
             <a:endParaRPr lang="en-US" dirty="0" smtClean="0"/>
           </a:p>
           <a:p>
             <a:pPr lvl="1"/>
             <a:r>
-              <a:rPr lang="en-US" dirty="0" smtClean="0"/>
-              <a:t>Introduction </a:t>
-            </a:r>
-            <a:r>
-              <a:rPr lang="en-US" dirty="0" smtClean="0"/>
-              <a:t>d’un nouveau standard d’HTML5 </a:t>
-            </a:r>
-            <a:r>
-              <a:rPr lang="en-US" dirty="0" err="1" smtClean="0"/>
-              <a:t>dans</a:t>
-            </a:r>
-            <a:r>
-              <a:rPr lang="en-US" dirty="0" smtClean="0"/>
-              <a:t> les </a:t>
-            </a:r>
-            <a:r>
-              <a:rPr lang="en-US" dirty="0" err="1" smtClean="0"/>
-              <a:t>systèmes</a:t>
-            </a:r>
-            <a:r>
-              <a:rPr lang="en-US" dirty="0" smtClean="0"/>
-              <a:t> </a:t>
-            </a:r>
-            <a:r>
-              <a:rPr lang="en-US" dirty="0" err="1" smtClean="0"/>
-              <a:t>embarqués</a:t>
-            </a:r>
-            <a:endParaRPr lang="en-US" dirty="0" smtClean="0"/>
-          </a:p>
-          <a:p>
-            <a:pPr lvl="1"/>
-            <a:r>
               <a:rPr lang="en-US" dirty="0" err="1" smtClean="0"/>
               <a:t>Connexion</a:t>
             </a:r>
@@ -7853,7 +7801,6 @@
               <a:rPr lang="en-US" dirty="0" smtClean="0"/>
               <a:t> à Internet:</a:t>
             </a:r>
-            <a:endParaRPr lang="en-US" dirty="0" smtClean="0"/>
           </a:p>
           <a:p>
             <a:pPr lvl="2"/>
@@ -7861,7 +7808,6 @@
               <a:rPr lang="en-US" dirty="0" smtClean="0"/>
               <a:t>Premiers prototypes</a:t>
             </a:r>
-            <a:endParaRPr lang="en-US" dirty="0" smtClean="0"/>
           </a:p>
           <a:p>
             <a:pPr lvl="2"/>
@@ -7936,71 +7882,56 @@
               <a:rPr lang="en-US" dirty="0" smtClean="0"/>
               <a:t> USB:</a:t>
             </a:r>
+          </a:p>
+          <a:p>
+            <a:pPr lvl="1"/>
+            <a:r>
+              <a:rPr lang="en-US" dirty="0" smtClean="0"/>
+              <a:t>HID: </a:t>
+            </a:r>
+            <a:r>
+              <a:rPr lang="en-US" dirty="0" err="1" smtClean="0"/>
+              <a:t>generique</a:t>
+            </a:r>
+            <a:r>
+              <a:rPr lang="en-US" dirty="0" smtClean="0"/>
+              <a:t> HID, </a:t>
+            </a:r>
+            <a:r>
+              <a:rPr lang="en-US" dirty="0" err="1" smtClean="0"/>
+              <a:t>souris</a:t>
+            </a:r>
+            <a:r>
+              <a:rPr lang="en-US" dirty="0" smtClean="0"/>
+              <a:t>, clavier</a:t>
+            </a:r>
+          </a:p>
+          <a:p>
+            <a:pPr lvl="1"/>
+            <a:r>
+              <a:rPr lang="en-US" dirty="0" smtClean="0"/>
+              <a:t>Port </a:t>
+            </a:r>
+            <a:r>
+              <a:rPr lang="en-US" dirty="0" err="1" smtClean="0"/>
+              <a:t>série</a:t>
+            </a:r>
+            <a:r>
+              <a:rPr lang="en-US" dirty="0" smtClean="0"/>
+              <a:t> </a:t>
+            </a:r>
+            <a:r>
+              <a:rPr lang="en-US" dirty="0" err="1" smtClean="0"/>
+              <a:t>virtuel</a:t>
+            </a:r>
             <a:endParaRPr lang="en-US" dirty="0" smtClean="0"/>
           </a:p>
           <a:p>
             <a:pPr lvl="1"/>
             <a:r>
               <a:rPr lang="en-US" dirty="0" smtClean="0"/>
-              <a:t>HID: </a:t>
-            </a:r>
-            <a:r>
-              <a:rPr lang="en-US" dirty="0" err="1" smtClean="0"/>
-              <a:t>generique</a:t>
-            </a:r>
-            <a:r>
-              <a:rPr lang="en-US" dirty="0" smtClean="0"/>
-              <a:t> </a:t>
-            </a:r>
-            <a:r>
-              <a:rPr lang="en-US" dirty="0" smtClean="0"/>
-              <a:t>HID</a:t>
-            </a:r>
-            <a:r>
-              <a:rPr lang="en-US" dirty="0" smtClean="0"/>
-              <a:t>, </a:t>
-            </a:r>
-            <a:r>
-              <a:rPr lang="en-US" dirty="0" err="1" smtClean="0"/>
-              <a:t>souris</a:t>
-            </a:r>
-            <a:r>
-              <a:rPr lang="en-US" dirty="0" smtClean="0"/>
-              <a:t>, clavier</a:t>
-            </a:r>
-            <a:endParaRPr lang="en-US" dirty="0" smtClean="0"/>
-          </a:p>
-          <a:p>
-            <a:pPr lvl="1"/>
-            <a:r>
-              <a:rPr lang="en-US" dirty="0" smtClean="0"/>
-              <a:t>Port </a:t>
-            </a:r>
-            <a:r>
-              <a:rPr lang="en-US" dirty="0" err="1" smtClean="0"/>
-              <a:t>série</a:t>
-            </a:r>
-            <a:r>
-              <a:rPr lang="en-US" dirty="0" smtClean="0"/>
-              <a:t> </a:t>
-            </a:r>
-            <a:r>
-              <a:rPr lang="en-US" dirty="0" err="1" smtClean="0"/>
-              <a:t>virtuel</a:t>
-            </a:r>
-            <a:endParaRPr lang="en-US" dirty="0" smtClean="0"/>
-          </a:p>
-          <a:p>
-            <a:pPr lvl="1"/>
-            <a:r>
-              <a:rPr lang="en-US" dirty="0" smtClean="0"/>
-              <a:t>Mass </a:t>
-            </a:r>
-            <a:r>
-              <a:rPr lang="en-US" dirty="0" smtClean="0"/>
-              <a:t>Storage</a:t>
-            </a:r>
-            <a:endParaRPr lang="en-US" dirty="0" smtClean="0"/>
+              <a:t>Mass Storage</a:t>
+            </a:r>
           </a:p>
           <a:p>
             <a:pPr lvl="1"/>
@@ -8086,12 +8017,11 @@
             </a:r>
             <a:r>
               <a:rPr lang="en-US" dirty="0" smtClean="0"/>
-              <a:t> attention</a:t>
-            </a:r>
-            <a:r>
-              <a:rPr lang="en-US" dirty="0" smtClean="0"/>
-              <a:t>!</a:t>
-            </a:r>
+              <a:t> attention!</a:t>
+            </a:r>
+            <a:br>
+              <a:rPr lang="en-US" dirty="0" smtClean="0"/>
+            </a:br>
             <a:r>
               <a:rPr lang="en-US" dirty="0" smtClean="0"/>
               <a:t/>
@@ -8101,18 +8031,7 @@
             </a:br>
             <a:r>
               <a:rPr lang="en-US" dirty="0" smtClean="0"/>
-              <a:t/>
-            </a:r>
-            <a:br>
-              <a:rPr lang="en-US" dirty="0" smtClean="0"/>
-            </a:br>
-            <a:r>
-              <a:rPr lang="en-US" dirty="0" smtClean="0"/>
-              <a:t>Des questions </a:t>
-            </a:r>
-            <a:r>
-              <a:rPr lang="en-US" dirty="0" smtClean="0"/>
-              <a:t>?</a:t>
+              <a:t>Des questions ?</a:t>
             </a:r>
             <a:endParaRPr lang="en-US" dirty="0"/>
           </a:p>
@@ -8168,7 +8087,7 @@
       </p:sp>
       <p:grpSp>
         <p:nvGrpSpPr>
-          <p:cNvPr id="5" name="Group 32"/>
+          <p:cNvPr id="3" name="Group 32"/>
           <p:cNvGrpSpPr>
             <a:grpSpLocks/>
           </p:cNvGrpSpPr>
@@ -8176,15 +8095,15 @@
         </p:nvGrpSpPr>
         <p:grpSpPr bwMode="auto">
           <a:xfrm>
-            <a:off x="268886" y="1682201"/>
-            <a:ext cx="8234371" cy="4340225"/>
-            <a:chOff x="221" y="1162"/>
-            <a:chExt cx="5187" cy="2734"/>
+            <a:off x="397474" y="1682201"/>
+            <a:ext cx="8201026" cy="4217988"/>
+            <a:chOff x="302" y="1162"/>
+            <a:chExt cx="5166" cy="2657"/>
           </a:xfrm>
         </p:grpSpPr>
         <p:grpSp>
           <p:nvGrpSpPr>
-            <p:cNvPr id="6" name="Group 21"/>
+            <p:cNvPr id="4" name="Group 21"/>
             <p:cNvGrpSpPr>
               <a:grpSpLocks/>
             </p:cNvGrpSpPr>
@@ -8192,10 +8111,10 @@
           </p:nvGrpSpPr>
           <p:grpSpPr bwMode="auto">
             <a:xfrm>
-              <a:off x="4171" y="1162"/>
-              <a:ext cx="1231" cy="1147"/>
-              <a:chOff x="4080" y="1162"/>
-              <a:chExt cx="1231" cy="1147"/>
+              <a:off x="4143" y="1162"/>
+              <a:ext cx="1179" cy="1147"/>
+              <a:chOff x="4052" y="1162"/>
+              <a:chExt cx="1179" cy="1147"/>
             </a:xfrm>
           </p:grpSpPr>
           <p:pic>
@@ -8215,7 +8134,7 @@
             </p:blipFill>
             <p:spPr bwMode="auto">
               <a:xfrm>
-                <a:off x="4105" y="1162"/>
+                <a:off x="4052" y="1162"/>
                 <a:ext cx="1179" cy="946"/>
               </a:xfrm>
               <a:prstGeom prst="rect">
@@ -8242,8 +8161,8 @@
             </p:nvSpPr>
             <p:spPr bwMode="auto">
               <a:xfrm>
-                <a:off x="4080" y="2115"/>
-                <a:ext cx="1231" cy="194"/>
+                <a:off x="4316" y="2115"/>
+                <a:ext cx="762" cy="194"/>
               </a:xfrm>
               <a:prstGeom prst="rect">
                 <a:avLst/>
@@ -8264,12 +8183,8 @@
               <a:lstStyle/>
               <a:p>
                 <a:r>
-                  <a:rPr lang="en-GB" sz="1400" b="1" dirty="0" err="1" smtClean="0"/>
-                  <a:t>Compilateur</a:t>
-                </a:r>
-                <a:r>
                   <a:rPr lang="en-GB" sz="1400" b="1" dirty="0" smtClean="0"/>
-                  <a:t> en </a:t>
+                  <a:t>IDE en </a:t>
                 </a:r>
                 <a:r>
                   <a:rPr lang="en-GB" sz="1400" b="1" dirty="0" err="1" smtClean="0"/>
@@ -8290,8 +8205,8 @@
           </p:nvSpPr>
           <p:spPr bwMode="auto">
             <a:xfrm>
-              <a:off x="221" y="1962"/>
-              <a:ext cx="1757" cy="330"/>
+              <a:off x="343" y="1962"/>
+              <a:ext cx="1595" cy="330"/>
             </a:xfrm>
             <a:prstGeom prst="rect">
               <a:avLst/>
@@ -8313,30 +8228,86 @@
             <a:p>
               <a:pPr algn="ctr"/>
               <a:r>
-                <a:rPr lang="en-GB" dirty="0" err="1" smtClean="0"/>
+                <a:rPr lang="en-GB" sz="1400" b="1" dirty="0" err="1" smtClean="0"/>
                 <a:t>Cartes</a:t>
               </a:r>
               <a:r>
-                <a:rPr lang="en-GB" dirty="0" smtClean="0"/>
-                <a:t> à base de </a:t>
-              </a:r>
-              <a:r>
                 <a:rPr lang="en-GB" sz="1400" b="1" dirty="0" smtClean="0"/>
-                <a:t>Cortex-M3 et </a:t>
+                <a:t> à base de Cortex-M3</a:t>
               </a:r>
             </a:p>
             <a:p>
               <a:pPr algn="ctr"/>
               <a:r>
-                <a:rPr lang="en-GB" sz="1400" b="1" dirty="0" smtClean="0"/>
-                <a:t>Cortex-M0</a:t>
+                <a:rPr lang="en-GB" dirty="0" smtClean="0"/>
+                <a:t>e</a:t>
               </a:r>
+              <a:r>
+                <a:rPr lang="en-GB" dirty="0" smtClean="0"/>
+                <a:t>t Cortex-M0</a:t>
+              </a:r>
+              <a:endParaRPr lang="en-GB" sz="1400" b="1" dirty="0"/>
+            </a:p>
+          </p:txBody>
+        </p:sp>
+        <p:sp>
+          <p:nvSpPr>
+            <p:cNvPr id="22" name="Text Box 16"/>
+            <p:cNvSpPr txBox="1">
+              <a:spLocks noChangeArrowheads="1"/>
+            </p:cNvSpPr>
+            <p:nvPr/>
+          </p:nvSpPr>
+          <p:spPr bwMode="auto">
+            <a:xfrm>
+              <a:off x="4198" y="3489"/>
+              <a:ext cx="1270" cy="330"/>
+            </a:xfrm>
+            <a:prstGeom prst="rect">
+              <a:avLst/>
+            </a:prstGeom>
+            <a:noFill/>
+            <a:ln w="9525">
+              <a:noFill/>
+              <a:miter lim="800000"/>
+              <a:headEnd/>
+              <a:tailEnd/>
+            </a:ln>
+            <a:effectLst/>
+          </p:spPr>
+          <p:txBody>
+            <a:bodyPr>
+              <a:spAutoFit/>
+            </a:bodyPr>
+            <a:lstStyle/>
+            <a:p>
+              <a:pPr algn="ctr"/>
+              <a:r>
+                <a:rPr lang="en-GB" dirty="0" smtClean="0"/>
+                <a:t>Website </a:t>
+              </a:r>
+              <a:r>
+                <a:rPr lang="en-GB" dirty="0" err="1" smtClean="0"/>
+                <a:t>Mbed</a:t>
+              </a:r>
+              <a:r>
+                <a:rPr lang="en-GB" dirty="0" smtClean="0"/>
+                <a:t>:</a:t>
+              </a:r>
+            </a:p>
+            <a:p>
+              <a:pPr algn="ctr"/>
+              <a:r>
+                <a:rPr lang="en-GB" sz="1400" b="1" dirty="0" err="1" smtClean="0"/>
+                <a:t>communauté</a:t>
+              </a:r>
+              <a:endParaRPr lang="en-GB" sz="1400" b="1" dirty="0"/>
             </a:p>
           </p:txBody>
         </p:sp>
         <p:grpSp>
           <p:nvGrpSpPr>
-            <p:cNvPr id="8" name="Group 19"/>
+            <p:cNvPr id="5" name="Group 20"/>
             <p:cNvGrpSpPr>
               <a:grpSpLocks/>
             </p:cNvGrpSpPr>
@@ -8344,106 +8315,10 @@
           </p:nvGrpSpPr>
           <p:grpSpPr bwMode="auto">
             <a:xfrm>
-              <a:off x="4138" y="2456"/>
-              <a:ext cx="1270" cy="1167"/>
-              <a:chOff x="4047" y="3681"/>
-              <a:chExt cx="1270" cy="1167"/>
-            </a:xfrm>
-          </p:grpSpPr>
-          <p:pic>
-            <p:nvPicPr>
-              <p:cNvPr id="21" name="Picture 15"/>
-              <p:cNvPicPr>
-                <a:picLocks noChangeAspect="1" noChangeArrowheads="1"/>
-              </p:cNvPicPr>
-              <p:nvPr/>
-            </p:nvPicPr>
-            <p:blipFill>
-              <a:blip r:embed="rId3"/>
-              <a:srcRect b="1219"/>
-              <a:stretch>
-                <a:fillRect/>
-              </a:stretch>
-            </p:blipFill>
-            <p:spPr bwMode="auto">
-              <a:xfrm>
-                <a:off x="4092" y="3681"/>
-                <a:ext cx="1179" cy="923"/>
-              </a:xfrm>
-              <a:prstGeom prst="rect">
-                <a:avLst/>
-              </a:prstGeom>
-              <a:noFill/>
-              <a:ln w="9525">
-                <a:solidFill>
-                  <a:schemeClr val="tx1"/>
-                </a:solidFill>
-                <a:miter lim="800000"/>
-                <a:headEnd/>
-                <a:tailEnd/>
-              </a:ln>
-              <a:effectLst/>
-            </p:spPr>
-          </p:pic>
-          <p:sp>
-            <p:nvSpPr>
-              <p:cNvPr id="22" name="Text Box 16"/>
-              <p:cNvSpPr txBox="1">
-                <a:spLocks noChangeArrowheads="1"/>
-              </p:cNvSpPr>
-              <p:nvPr/>
-            </p:nvSpPr>
-            <p:spPr bwMode="auto">
-              <a:xfrm>
-                <a:off x="4047" y="4654"/>
-                <a:ext cx="1270" cy="194"/>
-              </a:xfrm>
-              <a:prstGeom prst="rect">
-                <a:avLst/>
-              </a:prstGeom>
-              <a:noFill/>
-              <a:ln w="9525">
-                <a:noFill/>
-                <a:miter lim="800000"/>
-                <a:headEnd/>
-                <a:tailEnd/>
-              </a:ln>
-              <a:effectLst/>
-            </p:spPr>
-            <p:txBody>
-              <a:bodyPr>
-                <a:spAutoFit/>
-              </a:bodyPr>
-              <a:lstStyle/>
-              <a:p>
-                <a:pPr algn="ctr"/>
-                <a:r>
-                  <a:rPr lang="en-GB" sz="1400" b="1" dirty="0" err="1" smtClean="0"/>
-                  <a:t>Mbed</a:t>
-                </a:r>
-                <a:r>
-                  <a:rPr lang="en-GB" sz="1400" b="1" dirty="0" smtClean="0"/>
-                  <a:t> site web</a:t>
-                </a:r>
-                <a:endParaRPr lang="en-GB" sz="1400" b="1" dirty="0"/>
-              </a:p>
-            </p:txBody>
-          </p:sp>
-        </p:grpSp>
-        <p:grpSp>
-          <p:nvGrpSpPr>
-            <p:cNvPr id="9" name="Group 20"/>
-            <p:cNvGrpSpPr>
-              <a:grpSpLocks/>
-            </p:cNvGrpSpPr>
-            <p:nvPr/>
-          </p:nvGrpSpPr>
-          <p:grpSpPr bwMode="auto">
-            <a:xfrm>
-              <a:off x="249" y="2614"/>
-              <a:ext cx="1670" cy="1282"/>
-              <a:chOff x="204" y="981"/>
-              <a:chExt cx="1670" cy="1282"/>
+              <a:off x="302" y="2614"/>
+              <a:ext cx="1632" cy="1144"/>
+              <a:chOff x="257" y="981"/>
+              <a:chExt cx="1632" cy="1144"/>
             </a:xfrm>
           </p:grpSpPr>
           <p:pic>
@@ -8455,7 +8330,7 @@
               <p:nvPr/>
             </p:nvPicPr>
             <p:blipFill>
-              <a:blip r:embed="rId4"/>
+              <a:blip r:embed="rId3"/>
               <a:srcRect b="1472"/>
               <a:stretch>
                 <a:fillRect/>
@@ -8463,7 +8338,7 @@
             </p:blipFill>
             <p:spPr bwMode="auto">
               <a:xfrm>
-                <a:off x="431" y="981"/>
+                <a:off x="537" y="981"/>
                 <a:ext cx="1180" cy="934"/>
               </a:xfrm>
               <a:prstGeom prst="rect">
@@ -8490,8 +8365,8 @@
             </p:nvSpPr>
             <p:spPr bwMode="auto">
               <a:xfrm>
-                <a:off x="204" y="1933"/>
-                <a:ext cx="1670" cy="330"/>
+                <a:off x="257" y="1933"/>
+                <a:ext cx="1632" cy="192"/>
               </a:xfrm>
               <a:prstGeom prst="rect">
                 <a:avLst/>
@@ -8506,368 +8381,82 @@
               <a:effectLst/>
             </p:spPr>
             <p:txBody>
-              <a:bodyPr wrap="square">
+              <a:bodyPr>
                 <a:spAutoFit/>
               </a:bodyPr>
               <a:lstStyle/>
               <a:p>
                 <a:pPr algn="ctr"/>
                 <a:r>
-                  <a:rPr lang="en-GB" dirty="0" err="1" smtClean="0"/>
-                  <a:t>Bibliothèques</a:t>
-                </a:r>
-                <a:r>
-                  <a:rPr lang="en-GB" dirty="0" smtClean="0"/>
-                  <a:t> de haut </a:t>
-                </a:r>
-                <a:r>
-                  <a:rPr lang="en-GB" dirty="0" err="1" smtClean="0"/>
-                  <a:t>niveau</a:t>
-                </a:r>
-                <a:r>
-                  <a:rPr lang="en-GB" dirty="0" smtClean="0"/>
-                  <a:t> pour les </a:t>
-                </a:r>
-                <a:r>
-                  <a:rPr lang="en-GB" dirty="0" err="1" smtClean="0"/>
-                  <a:t>périphériques</a:t>
+                  <a:rPr lang="en-GB" sz="1400" b="1" dirty="0" smtClean="0"/>
+                  <a:t>C++ SDK</a:t>
                 </a:r>
                 <a:endParaRPr lang="en-GB" sz="1400" b="1" dirty="0"/>
               </a:p>
             </p:txBody>
           </p:sp>
         </p:grpSp>
-        <p:grpSp>
-          <p:nvGrpSpPr>
-            <p:cNvPr id="10" name="Group 29"/>
-            <p:cNvGrpSpPr>
-              <a:grpSpLocks/>
-            </p:cNvGrpSpPr>
+        <p:pic>
+          <p:nvPicPr>
+            <p:cNvPr id="18" name="Picture 4" descr="mbed-logo-blue"/>
+            <p:cNvPicPr>
+              <a:picLocks noChangeAspect="1" noChangeArrowheads="1"/>
+            </p:cNvPicPr>
             <p:nvPr/>
-          </p:nvGrpSpPr>
-          <p:grpSpPr bwMode="auto">
+          </p:nvPicPr>
+          <p:blipFill>
+            <a:blip r:embed="rId4"/>
+            <a:srcRect/>
+            <a:stretch>
+              <a:fillRect/>
+            </a:stretch>
+          </p:blipFill>
+          <p:spPr bwMode="auto">
             <a:xfrm>
-              <a:off x="1837" y="1616"/>
-              <a:ext cx="2132" cy="1956"/>
-              <a:chOff x="1837" y="1434"/>
-              <a:chExt cx="2132" cy="1956"/>
+              <a:off x="2362" y="2194"/>
+              <a:ext cx="1134" cy="362"/>
             </a:xfrm>
-          </p:grpSpPr>
-          <p:sp>
-            <p:nvSpPr>
-              <p:cNvPr id="11" name="Line 24"/>
-              <p:cNvSpPr>
-                <a:spLocks noChangeShapeType="1"/>
-              </p:cNvSpPr>
-              <p:nvPr/>
-            </p:nvSpPr>
-            <p:spPr bwMode="auto">
-              <a:xfrm>
-                <a:off x="1837" y="1434"/>
-                <a:ext cx="1088" cy="771"/>
-              </a:xfrm>
-              <a:prstGeom prst="line">
-                <a:avLst/>
-              </a:prstGeom>
-              <a:noFill/>
-              <a:ln w="63500">
-                <a:solidFill>
-                  <a:srgbClr val="00AAFF"/>
-                </a:solidFill>
-                <a:round/>
-                <a:headEnd type="triangle" w="med" len="med"/>
-                <a:tailEnd type="triangle" w="med" len="med"/>
-              </a:ln>
-              <a:effectLst/>
-            </p:spPr>
-            <p:txBody>
-              <a:bodyPr/>
-              <a:lstStyle/>
-              <a:p>
-                <a:endParaRPr lang="en-US"/>
-              </a:p>
-            </p:txBody>
-          </p:sp>
-          <p:sp>
-            <p:nvSpPr>
-              <p:cNvPr id="12" name="Text Box 23"/>
-              <p:cNvSpPr txBox="1">
-                <a:spLocks noChangeArrowheads="1"/>
-              </p:cNvSpPr>
-              <p:nvPr/>
-            </p:nvSpPr>
-            <p:spPr bwMode="auto">
-              <a:xfrm>
-                <a:off x="2103" y="3022"/>
-                <a:ext cx="1592" cy="368"/>
-              </a:xfrm>
-              <a:prstGeom prst="rect">
-                <a:avLst/>
-              </a:prstGeom>
-              <a:noFill/>
-              <a:ln w="9525">
-                <a:noFill/>
-                <a:miter lim="800000"/>
-                <a:headEnd/>
-                <a:tailEnd/>
-              </a:ln>
-              <a:effectLst/>
-            </p:spPr>
-            <p:txBody>
-              <a:bodyPr wrap="none">
-                <a:spAutoFit/>
-              </a:bodyPr>
-              <a:lstStyle/>
-              <a:p>
-                <a:pPr algn="ctr"/>
-                <a:r>
-                  <a:rPr lang="en-GB" sz="1600" b="1" dirty="0" err="1" smtClean="0">
-                    <a:solidFill>
-                      <a:srgbClr val="00AAFF"/>
-                    </a:solidFill>
-                    <a:latin typeface="Trebuchet MS" pitchFamily="34" charset="0"/>
-                  </a:rPr>
-                  <a:t>Prototypage</a:t>
-                </a:r>
-                <a:r>
-                  <a:rPr lang="en-GB" sz="1600" b="1" dirty="0" smtClean="0">
-                    <a:solidFill>
-                      <a:srgbClr val="00AAFF"/>
-                    </a:solidFill>
-                    <a:latin typeface="Trebuchet MS" pitchFamily="34" charset="0"/>
-                  </a:rPr>
-                  <a:t> </a:t>
-                </a:r>
-                <a:r>
-                  <a:rPr lang="en-GB" sz="1600" b="1" dirty="0" err="1" smtClean="0">
-                    <a:solidFill>
-                      <a:srgbClr val="00AAFF"/>
-                    </a:solidFill>
-                    <a:latin typeface="Trebuchet MS" pitchFamily="34" charset="0"/>
-                  </a:rPr>
-                  <a:t>rapide</a:t>
-                </a:r>
-                <a:r>
-                  <a:rPr lang="en-GB" sz="1600" b="1" dirty="0" smtClean="0">
-                    <a:solidFill>
-                      <a:srgbClr val="00AAFF"/>
-                    </a:solidFill>
-                    <a:latin typeface="Trebuchet MS" pitchFamily="34" charset="0"/>
-                  </a:rPr>
-                  <a:t> pour</a:t>
-                </a:r>
-              </a:p>
-              <a:p>
-                <a:pPr algn="ctr"/>
-                <a:r>
-                  <a:rPr lang="en-GB" sz="1600" dirty="0" err="1" smtClean="0">
-                    <a:solidFill>
-                      <a:srgbClr val="00AAFF"/>
-                    </a:solidFill>
-                    <a:latin typeface="Trebuchet MS" pitchFamily="34" charset="0"/>
-                  </a:rPr>
-                  <a:t>microcontrolleurs</a:t>
-                </a:r>
-                <a:endParaRPr lang="en-GB" sz="1600" b="1" dirty="0">
-                  <a:solidFill>
-                    <a:srgbClr val="00AAFF"/>
-                  </a:solidFill>
-                  <a:latin typeface="Trebuchet MS" pitchFamily="34" charset="0"/>
-                </a:endParaRPr>
-              </a:p>
-            </p:txBody>
-          </p:sp>
-          <p:sp>
-            <p:nvSpPr>
-              <p:cNvPr id="13" name="Line 25"/>
-              <p:cNvSpPr>
-                <a:spLocks noChangeShapeType="1"/>
-              </p:cNvSpPr>
-              <p:nvPr/>
-            </p:nvSpPr>
-            <p:spPr bwMode="auto">
-              <a:xfrm flipV="1">
-                <a:off x="1837" y="2205"/>
-                <a:ext cx="1088" cy="726"/>
-              </a:xfrm>
-              <a:prstGeom prst="line">
-                <a:avLst/>
-              </a:prstGeom>
-              <a:noFill/>
-              <a:ln w="63500">
-                <a:solidFill>
-                  <a:srgbClr val="00AAFF"/>
-                </a:solidFill>
-                <a:round/>
-                <a:headEnd type="triangle" w="med" len="med"/>
-                <a:tailEnd type="triangle" w="med" len="med"/>
-              </a:ln>
-              <a:effectLst/>
-            </p:spPr>
-            <p:txBody>
-              <a:bodyPr/>
-              <a:lstStyle/>
-              <a:p>
-                <a:endParaRPr lang="en-US"/>
-              </a:p>
-            </p:txBody>
-          </p:sp>
-          <p:sp>
-            <p:nvSpPr>
-              <p:cNvPr id="14" name="Line 26"/>
-              <p:cNvSpPr>
-                <a:spLocks noChangeShapeType="1"/>
-              </p:cNvSpPr>
-              <p:nvPr/>
-            </p:nvSpPr>
-            <p:spPr bwMode="auto">
-              <a:xfrm flipV="1">
-                <a:off x="2925" y="1434"/>
-                <a:ext cx="1044" cy="771"/>
-              </a:xfrm>
-              <a:prstGeom prst="line">
-                <a:avLst/>
-              </a:prstGeom>
-              <a:noFill/>
-              <a:ln w="63500">
-                <a:solidFill>
-                  <a:srgbClr val="00AAFF"/>
-                </a:solidFill>
-                <a:round/>
-                <a:headEnd type="triangle" w="med" len="med"/>
-                <a:tailEnd type="triangle" w="med" len="med"/>
-              </a:ln>
-              <a:effectLst/>
-            </p:spPr>
-            <p:txBody>
-              <a:bodyPr/>
-              <a:lstStyle/>
-              <a:p>
-                <a:endParaRPr lang="en-US"/>
-              </a:p>
-            </p:txBody>
-          </p:sp>
-          <p:sp>
-            <p:nvSpPr>
-              <p:cNvPr id="15" name="Line 27"/>
-              <p:cNvSpPr>
-                <a:spLocks noChangeShapeType="1"/>
-              </p:cNvSpPr>
-              <p:nvPr/>
-            </p:nvSpPr>
-            <p:spPr bwMode="auto">
-              <a:xfrm>
-                <a:off x="2925" y="2205"/>
-                <a:ext cx="1044" cy="726"/>
-              </a:xfrm>
-              <a:prstGeom prst="line">
-                <a:avLst/>
-              </a:prstGeom>
-              <a:noFill/>
-              <a:ln w="63500">
-                <a:solidFill>
-                  <a:srgbClr val="00AAFF"/>
-                </a:solidFill>
-                <a:round/>
-                <a:headEnd type="triangle" w="med" len="med"/>
-                <a:tailEnd type="triangle" w="med" len="med"/>
-              </a:ln>
-              <a:effectLst/>
-            </p:spPr>
-            <p:txBody>
-              <a:bodyPr/>
-              <a:lstStyle/>
-              <a:p>
-                <a:endParaRPr lang="en-US"/>
-              </a:p>
-            </p:txBody>
-          </p:sp>
-          <p:grpSp>
-            <p:nvGrpSpPr>
-              <p:cNvPr id="16" name="Group 9"/>
-              <p:cNvGrpSpPr>
-                <a:grpSpLocks/>
-              </p:cNvGrpSpPr>
-              <p:nvPr/>
-            </p:nvGrpSpPr>
-            <p:grpSpPr bwMode="auto">
-              <a:xfrm>
-                <a:off x="2200" y="1480"/>
-                <a:ext cx="1406" cy="1406"/>
-                <a:chOff x="2064" y="981"/>
-                <a:chExt cx="1406" cy="1406"/>
-              </a:xfrm>
-            </p:grpSpPr>
-            <p:sp>
-              <p:nvSpPr>
-                <p:cNvPr id="17" name="Oval 6"/>
-                <p:cNvSpPr>
-                  <a:spLocks noChangeArrowheads="1"/>
-                </p:cNvSpPr>
-                <p:nvPr/>
-              </p:nvSpPr>
-              <p:spPr bwMode="auto">
-                <a:xfrm>
-                  <a:off x="2064" y="981"/>
-                  <a:ext cx="1406" cy="1406"/>
-                </a:xfrm>
-                <a:prstGeom prst="ellipse">
-                  <a:avLst/>
-                </a:prstGeom>
-                <a:solidFill>
-                  <a:schemeClr val="bg1"/>
-                </a:solidFill>
-                <a:ln w="63500">
-                  <a:solidFill>
-                    <a:srgbClr val="00AAFF"/>
-                  </a:solidFill>
-                  <a:round/>
-                  <a:headEnd/>
-                  <a:tailEnd/>
-                </a:ln>
-                <a:effectLst/>
-              </p:spPr>
-              <p:txBody>
-                <a:bodyPr wrap="none" anchor="ctr"/>
-                <a:lstStyle/>
-                <a:p>
-                  <a:pPr algn="ctr"/>
-                  <a:endParaRPr lang="en-US"/>
-                </a:p>
-              </p:txBody>
-            </p:sp>
-            <p:pic>
-              <p:nvPicPr>
-                <p:cNvPr id="18" name="Picture 4" descr="mbed-logo-blue"/>
-                <p:cNvPicPr>
-                  <a:picLocks noChangeAspect="1" noChangeArrowheads="1"/>
-                </p:cNvPicPr>
-                <p:nvPr/>
-              </p:nvPicPr>
-              <p:blipFill>
-                <a:blip r:embed="rId5"/>
-                <a:srcRect/>
-                <a:stretch>
-                  <a:fillRect/>
-                </a:stretch>
-              </p:blipFill>
-              <p:spPr bwMode="auto">
-                <a:xfrm>
-                  <a:off x="2200" y="1480"/>
-                  <a:ext cx="1134" cy="362"/>
-                </a:xfrm>
-                <a:prstGeom prst="rect">
-                  <a:avLst/>
-                </a:prstGeom>
-                <a:noFill/>
-              </p:spPr>
-            </p:pic>
-          </p:grpSp>
-        </p:grpSp>
+            <a:prstGeom prst="rect">
+              <a:avLst/>
+            </a:prstGeom>
+            <a:noFill/>
+          </p:spPr>
+        </p:pic>
       </p:grpSp>
       <p:pic>
         <p:nvPicPr>
           <p:cNvPr id="1026" name="Picture 2" descr="C:\Users\samux\Desktop\ARM-internship-report\report\both_mbed.jpg"/>
+          <p:cNvPicPr>
+            <a:picLocks noChangeAspect="1" noChangeArrowheads="1"/>
+          </p:cNvPicPr>
+          <p:nvPr/>
+        </p:nvPicPr>
+        <p:blipFill>
+          <a:blip r:embed="rId5"/>
+          <a:srcRect/>
+          <a:stretch>
+            <a:fillRect/>
+          </a:stretch>
+        </p:blipFill>
+        <p:spPr bwMode="auto">
+          <a:xfrm>
+            <a:off x="630512" y="1822741"/>
+            <a:ext cx="2162563" cy="1040523"/>
+          </a:xfrm>
+          <a:prstGeom prst="rect">
+            <a:avLst/>
+          </a:prstGeom>
+          <a:noFill/>
+          <a:ln>
+            <a:solidFill>
+              <a:schemeClr val="tx1"/>
+            </a:solidFill>
+          </a:ln>
+        </p:spPr>
+      </p:pic>
+      <p:pic>
+        <p:nvPicPr>
+          <p:cNvPr id="2051" name="Picture 3" descr="C:\Users\samux\Desktop\ARM-internship-report\presentation_en\mbed_org.png"/>
           <p:cNvPicPr>
             <a:picLocks noChangeAspect="1" noChangeArrowheads="1"/>
           </p:cNvPicPr>
@@ -8882,8 +8471,8 @@
         </p:blipFill>
         <p:spPr bwMode="auto">
           <a:xfrm>
-            <a:off x="567452" y="1822741"/>
-            <a:ext cx="2162563" cy="1040523"/>
+            <a:off x="6400108" y="4046851"/>
+            <a:ext cx="2209606" cy="1305990"/>
           </a:xfrm>
           <a:prstGeom prst="rect">
             <a:avLst/>
@@ -8896,6 +8485,243 @@
           </a:ln>
         </p:spPr>
       </p:pic>
+      <p:cxnSp>
+        <p:nvCxnSpPr>
+          <p:cNvPr id="33" name="Connecteur droit avec flèche 32"/>
+          <p:cNvCxnSpPr/>
+          <p:nvPr/>
+        </p:nvCxnSpPr>
+        <p:spPr bwMode="auto">
+          <a:xfrm flipV="1">
+            <a:off x="5002924" y="2354316"/>
+            <a:ext cx="1220400" cy="892800"/>
+          </a:xfrm>
+          <a:prstGeom prst="straightConnector1">
+            <a:avLst/>
+          </a:prstGeom>
+          <a:ln>
+            <a:solidFill>
+              <a:srgbClr val="00B0F0"/>
+            </a:solidFill>
+            <a:headEnd type="none" w="med" len="med"/>
+            <a:tailEnd type="arrow"/>
+          </a:ln>
+        </p:spPr>
+        <p:style>
+          <a:lnRef idx="3">
+            <a:schemeClr val="accent1"/>
+          </a:lnRef>
+          <a:fillRef idx="0">
+            <a:schemeClr val="accent1"/>
+          </a:fillRef>
+          <a:effectRef idx="2">
+            <a:schemeClr val="accent1"/>
+          </a:effectRef>
+          <a:fontRef idx="minor">
+            <a:schemeClr val="tx1"/>
+          </a:fontRef>
+        </p:style>
+      </p:cxnSp>
+      <p:cxnSp>
+        <p:nvCxnSpPr>
+          <p:cNvPr id="34" name="Connecteur droit avec flèche 33"/>
+          <p:cNvCxnSpPr/>
+          <p:nvPr/>
+        </p:nvCxnSpPr>
+        <p:spPr bwMode="auto">
+          <a:xfrm flipH="1">
+            <a:off x="2995439" y="4030717"/>
+            <a:ext cx="1220400" cy="892800"/>
+          </a:xfrm>
+          <a:prstGeom prst="straightConnector1">
+            <a:avLst/>
+          </a:prstGeom>
+          <a:ln>
+            <a:solidFill>
+              <a:srgbClr val="00B0F0"/>
+            </a:solidFill>
+            <a:headEnd type="none" w="med" len="med"/>
+            <a:tailEnd type="arrow"/>
+          </a:ln>
+        </p:spPr>
+        <p:style>
+          <a:lnRef idx="3">
+            <a:schemeClr val="accent1"/>
+          </a:lnRef>
+          <a:fillRef idx="0">
+            <a:schemeClr val="accent1"/>
+          </a:fillRef>
+          <a:effectRef idx="2">
+            <a:schemeClr val="accent1"/>
+          </a:effectRef>
+          <a:fontRef idx="minor">
+            <a:schemeClr val="tx1"/>
+          </a:fontRef>
+        </p:style>
+      </p:cxnSp>
+      <p:cxnSp>
+        <p:nvCxnSpPr>
+          <p:cNvPr id="35" name="Connecteur droit avec flèche 34"/>
+          <p:cNvCxnSpPr/>
+          <p:nvPr/>
+        </p:nvCxnSpPr>
+        <p:spPr bwMode="auto">
+          <a:xfrm>
+            <a:off x="5039708" y="4020204"/>
+            <a:ext cx="1220400" cy="892800"/>
+          </a:xfrm>
+          <a:prstGeom prst="straightConnector1">
+            <a:avLst/>
+          </a:prstGeom>
+          <a:ln>
+            <a:solidFill>
+              <a:srgbClr val="00B0F0"/>
+            </a:solidFill>
+            <a:headEnd type="none" w="med" len="med"/>
+            <a:tailEnd type="arrow"/>
+          </a:ln>
+        </p:spPr>
+        <p:style>
+          <a:lnRef idx="3">
+            <a:schemeClr val="accent1"/>
+          </a:lnRef>
+          <a:fillRef idx="0">
+            <a:schemeClr val="accent1"/>
+          </a:fillRef>
+          <a:effectRef idx="2">
+            <a:schemeClr val="accent1"/>
+          </a:effectRef>
+          <a:fontRef idx="minor">
+            <a:schemeClr val="tx1"/>
+          </a:fontRef>
+        </p:style>
+      </p:cxnSp>
+      <p:cxnSp>
+        <p:nvCxnSpPr>
+          <p:cNvPr id="36" name="Connecteur droit avec flèche 35"/>
+          <p:cNvCxnSpPr/>
+          <p:nvPr/>
+        </p:nvCxnSpPr>
+        <p:spPr bwMode="auto">
+          <a:xfrm flipH="1" flipV="1">
+            <a:off x="2984939" y="2375337"/>
+            <a:ext cx="1219199" cy="893380"/>
+          </a:xfrm>
+          <a:prstGeom prst="straightConnector1">
+            <a:avLst/>
+          </a:prstGeom>
+          <a:ln>
+            <a:solidFill>
+              <a:srgbClr val="00B0F0"/>
+            </a:solidFill>
+            <a:headEnd type="none" w="med" len="med"/>
+            <a:tailEnd type="arrow"/>
+          </a:ln>
+        </p:spPr>
+        <p:style>
+          <a:lnRef idx="3">
+            <a:schemeClr val="accent1"/>
+          </a:lnRef>
+          <a:fillRef idx="0">
+            <a:schemeClr val="accent1"/>
+          </a:fillRef>
+          <a:effectRef idx="2">
+            <a:schemeClr val="accent1"/>
+          </a:effectRef>
+          <a:fontRef idx="minor">
+            <a:schemeClr val="tx1"/>
+          </a:fontRef>
+        </p:style>
+      </p:cxnSp>
+      <p:sp>
+        <p:nvSpPr>
+          <p:cNvPr id="27" name="Text Box 23"/>
+          <p:cNvSpPr txBox="1">
+            <a:spLocks noChangeArrowheads="1"/>
+          </p:cNvSpPr>
+          <p:nvPr/>
+        </p:nvSpPr>
+        <p:spPr bwMode="auto">
+          <a:xfrm>
+            <a:off x="3382688" y="4955407"/>
+            <a:ext cx="2527302" cy="584200"/>
+          </a:xfrm>
+          <a:prstGeom prst="rect">
+            <a:avLst/>
+          </a:prstGeom>
+          <a:noFill/>
+          <a:ln w="9525">
+            <a:noFill/>
+            <a:miter lim="800000"/>
+            <a:headEnd/>
+            <a:tailEnd/>
+          </a:ln>
+          <a:effectLst/>
+        </p:spPr>
+        <p:txBody>
+          <a:bodyPr wrap="none">
+            <a:spAutoFit/>
+          </a:bodyPr>
+          <a:lstStyle/>
+          <a:p>
+            <a:pPr algn="ctr"/>
+            <a:r>
+              <a:rPr lang="en-GB" sz="1600" b="1" dirty="0" err="1" smtClean="0">
+                <a:solidFill>
+                  <a:srgbClr val="00AAFF"/>
+                </a:solidFill>
+                <a:latin typeface="Trebuchet MS" pitchFamily="34" charset="0"/>
+              </a:rPr>
+              <a:t>Prototypage</a:t>
+            </a:r>
+            <a:r>
+              <a:rPr lang="en-GB" sz="1600" b="1" dirty="0" smtClean="0">
+                <a:solidFill>
+                  <a:srgbClr val="00AAFF"/>
+                </a:solidFill>
+                <a:latin typeface="Trebuchet MS" pitchFamily="34" charset="0"/>
+              </a:rPr>
+              <a:t> </a:t>
+            </a:r>
+            <a:r>
+              <a:rPr lang="en-GB" sz="1600" b="1" dirty="0" err="1" smtClean="0">
+                <a:solidFill>
+                  <a:srgbClr val="00AAFF"/>
+                </a:solidFill>
+                <a:latin typeface="Trebuchet MS" pitchFamily="34" charset="0"/>
+              </a:rPr>
+              <a:t>rapide</a:t>
+            </a:r>
+            <a:r>
+              <a:rPr lang="en-GB" sz="1600" b="1" dirty="0" smtClean="0">
+                <a:solidFill>
+                  <a:srgbClr val="00AAFF"/>
+                </a:solidFill>
+                <a:latin typeface="Trebuchet MS" pitchFamily="34" charset="0"/>
+              </a:rPr>
+              <a:t> pour</a:t>
+            </a:r>
+          </a:p>
+          <a:p>
+            <a:pPr algn="ctr"/>
+            <a:r>
+              <a:rPr lang="en-GB" sz="1600" dirty="0" err="1" smtClean="0">
+                <a:solidFill>
+                  <a:srgbClr val="00AAFF"/>
+                </a:solidFill>
+                <a:latin typeface="Trebuchet MS" pitchFamily="34" charset="0"/>
+              </a:rPr>
+              <a:t>microcontrolleurs</a:t>
+            </a:r>
+            <a:endParaRPr lang="en-GB" sz="1600" b="1" dirty="0">
+              <a:solidFill>
+                <a:srgbClr val="00AAFF"/>
+              </a:solidFill>
+              <a:latin typeface="Trebuchet MS" pitchFamily="34" charset="0"/>
+            </a:endParaRPr>
+          </a:p>
+        </p:txBody>
+      </p:sp>
     </p:spTree>
   </p:cSld>
   <p:clrMapOvr>
@@ -9003,11 +8829,7 @@
           <a:p>
             <a:r>
               <a:rPr lang="en-US" dirty="0" smtClean="0"/>
-              <a:t>Internet </a:t>
-            </a:r>
-            <a:r>
-              <a:rPr lang="en-US" dirty="0" smtClean="0"/>
-              <a:t>des </a:t>
+              <a:t>Internet des </a:t>
             </a:r>
             <a:r>
               <a:rPr lang="en-US" dirty="0" err="1" smtClean="0"/>
@@ -9100,17 +8922,12 @@
               <a:rPr lang="en-US" dirty="0" smtClean="0"/>
               <a:t>:</a:t>
             </a:r>
-            <a:endParaRPr lang="en-US" dirty="0" smtClean="0"/>
           </a:p>
           <a:p>
             <a:pPr lvl="1"/>
             <a:r>
               <a:rPr lang="en-US" dirty="0" smtClean="0"/>
-              <a:t>15 </a:t>
-            </a:r>
-            <a:r>
-              <a:rPr lang="en-US" dirty="0" smtClean="0"/>
-              <a:t>milliards </a:t>
+              <a:t>15 milliards </a:t>
             </a:r>
             <a:r>
               <a:rPr lang="en-US" dirty="0" err="1" smtClean="0"/>
@@ -9225,22 +9042,7 @@
                   <a:uFillTx/>
                   <a:latin typeface="+mn-lt"/>
                 </a:rPr>
-                <a:t>       </a:t>
-              </a:r>
-              <a:r>
-                <a:rPr kumimoji="0" lang="en-US" sz="2000" b="0" i="0" u="none" strike="noStrike" kern="0" cap="none" spc="0" normalizeH="0" baseline="0" noProof="0" dirty="0" smtClean="0">
-                  <a:ln>
-                    <a:noFill/>
-                  </a:ln>
-                  <a:solidFill>
-                    <a:srgbClr val="000000"/>
-                  </a:solidFill>
-                  <a:effectLst/>
-                  <a:uLnTx/>
-                  <a:uFillTx/>
-                  <a:latin typeface="+mn-lt"/>
-                </a:rPr>
-                <a:t>La </a:t>
+                <a:t>       La </a:t>
               </a:r>
               <a:r>
                 <a:rPr kumimoji="0" lang="en-US" sz="2000" b="0" i="0" u="none" strike="noStrike" kern="0" cap="none" spc="0" normalizeH="0" baseline="0" noProof="0" dirty="0" err="1" smtClean="0">
@@ -9411,13 +9213,7 @@
                 <a:rPr lang="en-US" sz="2000" b="0" kern="0" dirty="0" smtClean="0">
                   <a:latin typeface="+mn-lt"/>
                 </a:rPr>
-                <a:t> </a:t>
-              </a:r>
-              <a:r>
-                <a:rPr lang="en-US" sz="2000" b="0" kern="0" dirty="0" smtClean="0">
-                  <a:latin typeface="+mn-lt"/>
-                </a:rPr>
-                <a:t>pour </a:t>
+                <a:t> pour </a:t>
               </a:r>
               <a:r>
                 <a:rPr lang="en-US" sz="2000" b="0" kern="0" dirty="0" err="1" smtClean="0">
@@ -9556,22 +9352,7 @@
                   <a:uFillTx/>
                   <a:latin typeface="+mn-lt"/>
                 </a:rPr>
-                <a:t> </a:t>
-              </a:r>
-              <a:r>
-                <a:rPr kumimoji="0" lang="en-US" sz="2000" b="0" i="0" u="none" strike="noStrike" kern="0" cap="none" spc="0" normalizeH="0" baseline="0" noProof="0" dirty="0" smtClean="0">
-                  <a:ln>
-                    <a:noFill/>
-                  </a:ln>
-                  <a:solidFill>
-                    <a:srgbClr val="000000"/>
-                  </a:solidFill>
-                  <a:effectLst/>
-                  <a:uLnTx/>
-                  <a:uFillTx/>
-                  <a:latin typeface="+mn-lt"/>
-                </a:rPr>
-                <a:t>   </a:t>
+                <a:t>    </a:t>
               </a:r>
               <a:r>
                 <a:rPr kumimoji="0" lang="en-US" sz="2000" b="0" i="0" u="none" strike="noStrike" kern="0" cap="none" spc="0" normalizeH="0" baseline="0" noProof="0" dirty="0" err="1" smtClean="0">
@@ -9779,17 +9560,8 @@
           <a:p>
             <a:r>
               <a:rPr lang="en-US" dirty="0" smtClean="0"/>
-              <a:t>Nouveau standard d’HTML5 (</a:t>
-            </a:r>
-            <a:r>
-              <a:rPr lang="en-US" dirty="0" smtClean="0"/>
-              <a:t>RFC 6455</a:t>
-            </a:r>
-            <a:r>
-              <a:rPr lang="en-US" dirty="0" smtClean="0"/>
-              <a:t>):</a:t>
-            </a:r>
-            <a:endParaRPr lang="en-US" dirty="0" smtClean="0"/>
+              <a:t>Nouveau standard d’HTML5 (RFC 6455):</a:t>
+            </a:r>
           </a:p>
           <a:p>
             <a:pPr lvl="1"/>
@@ -9832,40 +9604,38 @@
               <a:rPr lang="en-US" dirty="0" smtClean="0"/>
               <a:t> unique socket TCP</a:t>
             </a:r>
+          </a:p>
+          <a:p>
+            <a:pPr lvl="1"/>
+            <a:r>
+              <a:rPr lang="en-US" dirty="0" err="1" smtClean="0"/>
+              <a:t>Réduction</a:t>
+            </a:r>
+            <a:r>
+              <a:rPr lang="en-US" dirty="0" smtClean="0"/>
+              <a:t> de </a:t>
+            </a:r>
+            <a:r>
+              <a:rPr lang="en-US" dirty="0" err="1" smtClean="0"/>
+              <a:t>l’overhead</a:t>
+            </a:r>
             <a:endParaRPr lang="en-US" dirty="0" smtClean="0"/>
           </a:p>
           <a:p>
             <a:pPr lvl="1"/>
             <a:r>
               <a:rPr lang="en-US" dirty="0" err="1" smtClean="0"/>
-              <a:t>Réduction</a:t>
-            </a:r>
-            <a:r>
-              <a:rPr lang="en-US" dirty="0" smtClean="0"/>
-              <a:t> de </a:t>
-            </a:r>
-            <a:r>
-              <a:rPr lang="en-US" dirty="0" err="1" smtClean="0"/>
-              <a:t>l’overhead</a:t>
-            </a:r>
-            <a:endParaRPr lang="en-US" dirty="0" smtClean="0"/>
+              <a:t>Moins</a:t>
+            </a:r>
+            <a:r>
+              <a:rPr lang="en-US" dirty="0" smtClean="0"/>
+              <a:t> de traffic</a:t>
+            </a:r>
           </a:p>
           <a:p>
             <a:pPr lvl="1"/>
             <a:r>
               <a:rPr lang="en-US" dirty="0" err="1" smtClean="0"/>
-              <a:t>Moins</a:t>
-            </a:r>
-            <a:r>
-              <a:rPr lang="en-US" dirty="0" smtClean="0"/>
-              <a:t> de traffic</a:t>
-            </a:r>
-            <a:endParaRPr lang="en-US" dirty="0" smtClean="0"/>
-          </a:p>
-          <a:p>
-            <a:pPr lvl="1"/>
-            <a:r>
-              <a:rPr lang="en-US" dirty="0" err="1" smtClean="0"/>
               <a:t>Connexion</a:t>
             </a:r>
             <a:r>
@@ -9874,7 +9644,7 @@
             </a:r>
             <a:r>
               <a:rPr lang="en-US" dirty="0" err="1" smtClean="0"/>
-              <a:t>sécurisé</a:t>
+              <a:t>sécurisée</a:t>
             </a:r>
             <a:r>
               <a:rPr lang="en-US" dirty="0" smtClean="0"/>
@@ -9890,11 +9660,7 @@
             </a:r>
             <a:r>
               <a:rPr lang="en-US" dirty="0" smtClean="0"/>
-              <a:t>:// </a:t>
-            </a:r>
-            <a:r>
-              <a:rPr lang="en-US" dirty="0" smtClean="0"/>
-              <a:t>et </a:t>
+              <a:t>:// et </a:t>
             </a:r>
             <a:r>
               <a:rPr lang="en-US" dirty="0" err="1" smtClean="0"/>
@@ -9942,7 +9708,6 @@
               <a:rPr lang="en-US" dirty="0" smtClean="0"/>
               <a:t> ?</a:t>
             </a:r>
-            <a:endParaRPr lang="en-US" dirty="0" smtClean="0"/>
           </a:p>
           <a:p>
             <a:pPr lvl="1"/>
@@ -9960,15 +9725,7 @@
             </a:r>
             <a:r>
               <a:rPr lang="en-US" dirty="0" smtClean="0"/>
-              <a:t> techniques de polling</a:t>
-            </a:r>
-            <a:r>
-              <a:rPr lang="en-US" dirty="0" smtClean="0"/>
-              <a:t> </a:t>
-            </a:r>
-            <a:r>
-              <a:rPr lang="en-US" dirty="0" smtClean="0"/>
-              <a:t>(AJAX)</a:t>
+              <a:t> techniques de polling (AJAX)</a:t>
             </a:r>
           </a:p>
           <a:p>
@@ -10779,11 +10536,7 @@
             </a:r>
             <a:r>
               <a:rPr lang="en-US" dirty="0" smtClean="0"/>
-              <a:t> </a:t>
-            </a:r>
-            <a:r>
-              <a:rPr lang="en-US" dirty="0" smtClean="0"/>
-              <a:t>de </a:t>
+              <a:t> de </a:t>
             </a:r>
             <a:r>
               <a:rPr lang="en-US" dirty="0" err="1" smtClean="0"/>
@@ -11359,7 +11112,7 @@
         <p:spPr bwMode="auto">
           <a:xfrm>
             <a:off x="1376855" y="4414344"/>
-            <a:ext cx="6863256" cy="1460937"/>
+            <a:ext cx="6863256" cy="1219201"/>
           </a:xfrm>
           <a:prstGeom prst="rect">
             <a:avLst/>
@@ -11463,10 +11216,6 @@
               </a:rPr>
               <a:t> </a:t>
             </a:r>
-            <a:endParaRPr lang="en-US" sz="1800" b="0" kern="0" dirty="0" smtClean="0">
-              <a:latin typeface="+mn-lt"/>
-              <a:ea typeface="+mn-ea"/>
-            </a:endParaRPr>
           </a:p>
           <a:p>
             <a:pPr marL="722313" lvl="1" indent="-265113" algn="l" fontAlgn="ctr">
@@ -11675,99 +11424,6 @@
               </a:rPr>
               <a:t>reçus</a:t>
             </a:r>
-            <a:endParaRPr lang="en-US" sz="1800" b="0" kern="0" dirty="0" smtClean="0">
-              <a:latin typeface="+mn-lt"/>
-              <a:ea typeface="+mn-ea"/>
-            </a:endParaRPr>
-          </a:p>
-          <a:p>
-            <a:pPr marL="722313" lvl="1" indent="-265113" algn="l" fontAlgn="ctr">
-              <a:spcBef>
-                <a:spcPct val="25000"/>
-              </a:spcBef>
-              <a:buClr>
-                <a:schemeClr val="accent1"/>
-              </a:buClr>
-              <a:buSzPct val="125000"/>
-              <a:buFont typeface="Wingdings" pitchFamily="2" charset="2"/>
-              <a:buChar char="§"/>
-            </a:pPr>
-            <a:r>
-              <a:rPr lang="en-US" sz="1800" b="0" kern="0" dirty="0" smtClean="0">
-                <a:latin typeface="+mn-lt"/>
-                <a:ea typeface="+mn-ea"/>
-              </a:rPr>
-              <a:t>Les </a:t>
-            </a:r>
-            <a:r>
-              <a:rPr lang="en-US" sz="1800" b="0" kern="0" dirty="0" err="1" smtClean="0">
-                <a:latin typeface="+mn-lt"/>
-                <a:ea typeface="+mn-ea"/>
-              </a:rPr>
-              <a:t>navigateurs</a:t>
-            </a:r>
-            <a:r>
-              <a:rPr lang="en-US" sz="1800" b="0" kern="0" dirty="0" smtClean="0">
-                <a:latin typeface="+mn-lt"/>
-                <a:ea typeface="+mn-ea"/>
-              </a:rPr>
-              <a:t> </a:t>
-            </a:r>
-            <a:r>
-              <a:rPr lang="en-US" sz="1800" b="0" kern="0" dirty="0" err="1" smtClean="0">
-                <a:latin typeface="+mn-lt"/>
-                <a:ea typeface="+mn-ea"/>
-              </a:rPr>
-              <a:t>vont</a:t>
-            </a:r>
-            <a:r>
-              <a:rPr lang="en-US" sz="1800" b="0" kern="0" dirty="0" smtClean="0">
-                <a:latin typeface="+mn-lt"/>
-                <a:ea typeface="+mn-ea"/>
-              </a:rPr>
-              <a:t> </a:t>
-            </a:r>
-            <a:r>
-              <a:rPr lang="en-US" sz="1800" b="0" kern="0" dirty="0" err="1" smtClean="0">
-                <a:latin typeface="+mn-lt"/>
-                <a:ea typeface="+mn-ea"/>
-              </a:rPr>
-              <a:t>recevoir</a:t>
-            </a:r>
-            <a:r>
-              <a:rPr lang="en-US" sz="1800" b="0" kern="0" dirty="0" smtClean="0">
-                <a:latin typeface="+mn-lt"/>
-                <a:ea typeface="+mn-ea"/>
-              </a:rPr>
-              <a:t> </a:t>
-            </a:r>
-            <a:endParaRPr kumimoji="0" lang="en-US" sz="1800" b="0" i="0" u="none" strike="noStrike" kern="0" cap="none" spc="0" normalizeH="0" baseline="0" noProof="0" dirty="0" smtClean="0">
-              <a:ln>
-                <a:noFill/>
-              </a:ln>
-              <a:solidFill>
-                <a:srgbClr val="000000"/>
-              </a:solidFill>
-              <a:effectLst/>
-              <a:uLnTx/>
-              <a:uFillTx/>
-              <a:latin typeface="+mn-lt"/>
-              <a:ea typeface="+mn-ea"/>
-              <a:cs typeface="+mn-cs"/>
-            </a:endParaRPr>
-          </a:p>
-          <a:p>
-            <a:pPr marL="722313" lvl="1" indent="-265113" algn="l" fontAlgn="ctr">
-              <a:spcBef>
-                <a:spcPct val="25000"/>
-              </a:spcBef>
-              <a:buClr>
-                <a:schemeClr val="accent1"/>
-              </a:buClr>
-              <a:buSzPct val="125000"/>
-              <a:buFont typeface="Wingdings" pitchFamily="2" charset="2"/>
-              <a:buChar char="§"/>
-            </a:pPr>
             <a:endParaRPr kumimoji="0" lang="en-US" sz="1800" b="0" i="0" u="none" strike="noStrike" kern="0" cap="none" spc="0" normalizeH="0" baseline="0" noProof="0" dirty="0">
               <a:ln>
                 <a:noFill/>

</xml_diff>